<commit_message>
[master] added zip file for lab 6
</commit_message>
<xml_diff>
--- a/theory_06-representational-state-transfer/theory_06-representational-state-transfer.pptx
+++ b/theory_06-representational-state-transfer/theory_06-representational-state-transfer.pptx
@@ -5,7 +5,7 @@
     <p:sldMasterId id="2147483648" r:id="rId1"/>
   </p:sldMasterIdLst>
   <p:notesMasterIdLst>
-    <p:notesMasterId r:id="rId25"/>
+    <p:notesMasterId r:id="rId26"/>
   </p:notesMasterIdLst>
   <p:sldIdLst>
     <p:sldId id="256" r:id="rId2"/>
@@ -25,12 +25,13 @@
     <p:sldId id="267" r:id="rId16"/>
     <p:sldId id="270" r:id="rId17"/>
     <p:sldId id="271" r:id="rId18"/>
-    <p:sldId id="272" r:id="rId19"/>
-    <p:sldId id="278" r:id="rId20"/>
-    <p:sldId id="275" r:id="rId21"/>
-    <p:sldId id="274" r:id="rId22"/>
-    <p:sldId id="281" r:id="rId23"/>
-    <p:sldId id="273" r:id="rId24"/>
+    <p:sldId id="282" r:id="rId19"/>
+    <p:sldId id="272" r:id="rId20"/>
+    <p:sldId id="278" r:id="rId21"/>
+    <p:sldId id="275" r:id="rId22"/>
+    <p:sldId id="274" r:id="rId23"/>
+    <p:sldId id="281" r:id="rId24"/>
+    <p:sldId id="273" r:id="rId25"/>
   </p:sldIdLst>
   <p:sldSz cx="12192000" cy="6858000"/>
   <p:notesSz cx="6858000" cy="9144000"/>
@@ -4729,8 +4730,8 @@
           </a:p>
         </p:txBody>
       </p:sp>
-      <mc:AlternateContent xmlns:mc="http://schemas.openxmlformats.org/markup-compatibility/2006">
-        <mc:Choice xmlns:a14="http://schemas.microsoft.com/office/drawing/2010/main" Requires="a14">
+      <mc:AlternateContent xmlns:mc="http://schemas.openxmlformats.org/markup-compatibility/2006" xmlns:a14="http://schemas.microsoft.com/office/drawing/2010/main">
+        <mc:Choice Requires="a14">
           <p:sp>
             <p:nvSpPr>
               <p:cNvPr id="3" name="Segnaposto contenuto 2"/>
@@ -4943,7 +4944,7 @@
             </p:txBody>
           </p:sp>
         </mc:Choice>
-        <mc:Fallback>
+        <mc:Fallback xmlns="">
           <p:sp>
             <p:nvSpPr>
               <p:cNvPr id="3" name="Segnaposto contenuto 2"/>
@@ -5761,11 +5762,7 @@
           <a:p>
             <a:r>
               <a:rPr lang="it-IT" dirty="0"/>
-              <a:t>Resource </a:t>
-            </a:r>
-            <a:r>
-              <a:rPr lang="it-IT" dirty="0" err="1"/>
-              <a:t>representations</a:t>
+              <a:t>ADD EXAMPLE</a:t>
             </a:r>
             <a:endParaRPr lang="en-GB" dirty="0"/>
           </a:p>
@@ -5787,616 +5784,16 @@
           <a:lstStyle/>
           <a:p>
             <a:r>
-              <a:rPr lang="en-US" b="1" dirty="0"/>
-              <a:t>Resource representation</a:t>
-            </a:r>
-            <a:r>
-              <a:rPr lang="en-US" dirty="0"/>
-              <a:t>: a view of the current state (or realization) of the resource at the time of the request. </a:t>
-            </a:r>
-          </a:p>
-          <a:p>
-            <a:r>
-              <a:rPr lang="en-US" dirty="0"/>
-              <a:t>In a client-server interaction, the client asks to the server a resource (by the resource identifier), and the server answers by sending the corresponding resource representation. </a:t>
-            </a:r>
-          </a:p>
-          <a:p>
-            <a:r>
-              <a:rPr lang="en-US" b="1" dirty="0"/>
-              <a:t>Note</a:t>
-            </a:r>
-            <a:r>
-              <a:rPr lang="en-US" dirty="0"/>
-              <a:t>: The representation sent to the client is not necessarily the same used to store the data in the server.  </a:t>
-            </a:r>
-          </a:p>
-          <a:p>
-            <a:endParaRPr lang="en-GB" dirty="0"/>
-          </a:p>
-        </p:txBody>
-      </p:sp>
-      <p:sp>
-        <p:nvSpPr>
-          <p:cNvPr id="4" name="Rettangolo 3"/>
-          <p:cNvSpPr/>
-          <p:nvPr/>
-        </p:nvSpPr>
-        <p:spPr>
-          <a:xfrm>
-            <a:off x="1714500" y="4677276"/>
-            <a:ext cx="2225842" cy="1287379"/>
-          </a:xfrm>
-          <a:prstGeom prst="rect">
-            <a:avLst/>
-          </a:prstGeom>
-          <a:ln w="38100">
-            <a:solidFill>
-              <a:srgbClr val="00B050"/>
-            </a:solidFill>
-          </a:ln>
-        </p:spPr>
-        <p:style>
-          <a:lnRef idx="2">
-            <a:schemeClr val="accent6"/>
-          </a:lnRef>
-          <a:fillRef idx="1">
-            <a:schemeClr val="lt1"/>
-          </a:fillRef>
-          <a:effectRef idx="0">
-            <a:schemeClr val="accent6"/>
-          </a:effectRef>
-          <a:fontRef idx="minor">
-            <a:schemeClr val="dk1"/>
-          </a:fontRef>
-        </p:style>
-        <p:txBody>
-          <a:bodyPr rtlCol="0" anchor="ctr"/>
-          <a:lstStyle/>
-          <a:p>
-            <a:pPr algn="ctr"/>
-            <a:r>
-              <a:rPr lang="it-IT" sz="2800" dirty="0">
-                <a:latin typeface="Palatino Linotype" panose="02040502050505030304" pitchFamily="18" charset="0"/>
-              </a:rPr>
-              <a:t>Client</a:t>
-            </a:r>
-            <a:endParaRPr lang="en-GB" sz="2800" dirty="0">
-              <a:latin typeface="Palatino Linotype" panose="02040502050505030304" pitchFamily="18" charset="0"/>
-            </a:endParaRPr>
-          </a:p>
-        </p:txBody>
-      </p:sp>
-      <p:sp>
-        <p:nvSpPr>
-          <p:cNvPr id="5" name="Rettangolo 4"/>
-          <p:cNvSpPr/>
-          <p:nvPr/>
-        </p:nvSpPr>
-        <p:spPr>
-          <a:xfrm>
-            <a:off x="8339890" y="4265195"/>
-            <a:ext cx="2225842" cy="2111542"/>
-          </a:xfrm>
-          <a:prstGeom prst="rect">
-            <a:avLst/>
-          </a:prstGeom>
-          <a:ln w="38100">
-            <a:solidFill>
-              <a:srgbClr val="00B050"/>
-            </a:solidFill>
-          </a:ln>
-        </p:spPr>
-        <p:style>
-          <a:lnRef idx="2">
-            <a:schemeClr val="accent6"/>
-          </a:lnRef>
-          <a:fillRef idx="1">
-            <a:schemeClr val="lt1"/>
-          </a:fillRef>
-          <a:effectRef idx="0">
-            <a:schemeClr val="accent6"/>
-          </a:effectRef>
-          <a:fontRef idx="minor">
-            <a:schemeClr val="dk1"/>
-          </a:fontRef>
-        </p:style>
-        <p:txBody>
-          <a:bodyPr rtlCol="0" anchor="t"/>
-          <a:lstStyle/>
-          <a:p>
-            <a:pPr algn="ctr"/>
-            <a:r>
-              <a:rPr lang="it-IT" sz="2400" dirty="0">
-                <a:latin typeface="Palatino Linotype" panose="02040502050505030304" pitchFamily="18" charset="0"/>
-              </a:rPr>
-              <a:t>Server</a:t>
-            </a:r>
-          </a:p>
-        </p:txBody>
-      </p:sp>
-      <p:cxnSp>
-        <p:nvCxnSpPr>
-          <p:cNvPr id="7" name="Connettore 2 6"/>
-          <p:cNvCxnSpPr/>
-          <p:nvPr/>
-        </p:nvCxnSpPr>
-        <p:spPr>
-          <a:xfrm flipV="1">
-            <a:off x="4421605" y="4746458"/>
-            <a:ext cx="3410953" cy="24063"/>
-          </a:xfrm>
-          <a:prstGeom prst="straightConnector1">
-            <a:avLst/>
-          </a:prstGeom>
-          <a:ln w="28575">
-            <a:solidFill>
-              <a:schemeClr val="tx1"/>
-            </a:solidFill>
-            <a:tailEnd type="triangle"/>
-          </a:ln>
-        </p:spPr>
-        <p:style>
-          <a:lnRef idx="1">
-            <a:schemeClr val="accent1"/>
-          </a:lnRef>
-          <a:fillRef idx="0">
-            <a:schemeClr val="accent1"/>
-          </a:fillRef>
-          <a:effectRef idx="0">
-            <a:schemeClr val="accent1"/>
-          </a:effectRef>
-          <a:fontRef idx="minor">
-            <a:schemeClr val="tx1"/>
-          </a:fontRef>
-        </p:style>
-      </p:cxnSp>
-      <p:sp>
-        <p:nvSpPr>
-          <p:cNvPr id="9" name="CasellaDiTesto 8"/>
-          <p:cNvSpPr txBox="1"/>
-          <p:nvPr/>
-        </p:nvSpPr>
-        <p:spPr>
-          <a:xfrm>
-            <a:off x="5075183" y="4310555"/>
-            <a:ext cx="2358190" cy="369332"/>
-          </a:xfrm>
-          <a:prstGeom prst="rect">
-            <a:avLst/>
-          </a:prstGeom>
-          <a:noFill/>
-        </p:spPr>
-        <p:txBody>
-          <a:bodyPr wrap="square" rtlCol="0">
-            <a:spAutoFit/>
-          </a:bodyPr>
-          <a:lstStyle/>
-          <a:p>
-            <a:r>
-              <a:rPr lang="it-IT" dirty="0">
-                <a:latin typeface="Palatino Linotype" panose="02040502050505030304" pitchFamily="18" charset="0"/>
-              </a:rPr>
-              <a:t>Resource </a:t>
-            </a:r>
-            <a:r>
-              <a:rPr lang="it-IT" dirty="0" err="1">
-                <a:latin typeface="Palatino Linotype" panose="02040502050505030304" pitchFamily="18" charset="0"/>
-              </a:rPr>
-              <a:t>identifier</a:t>
-            </a:r>
-            <a:endParaRPr lang="en-GB" dirty="0">
-              <a:latin typeface="Palatino Linotype" panose="02040502050505030304" pitchFamily="18" charset="0"/>
-            </a:endParaRPr>
-          </a:p>
-        </p:txBody>
-      </p:sp>
-      <p:cxnSp>
-        <p:nvCxnSpPr>
-          <p:cNvPr id="10" name="Connettore 2 9"/>
-          <p:cNvCxnSpPr/>
-          <p:nvPr/>
-        </p:nvCxnSpPr>
-        <p:spPr>
-          <a:xfrm flipH="1">
-            <a:off x="4421605" y="5759639"/>
-            <a:ext cx="3384884" cy="0"/>
-          </a:xfrm>
-          <a:prstGeom prst="straightConnector1">
-            <a:avLst/>
-          </a:prstGeom>
-          <a:ln w="28575">
-            <a:solidFill>
-              <a:schemeClr val="tx1"/>
-            </a:solidFill>
-            <a:tailEnd type="triangle"/>
-          </a:ln>
-        </p:spPr>
-        <p:style>
-          <a:lnRef idx="1">
-            <a:schemeClr val="accent1"/>
-          </a:lnRef>
-          <a:fillRef idx="0">
-            <a:schemeClr val="accent1"/>
-          </a:fillRef>
-          <a:effectRef idx="0">
-            <a:schemeClr val="accent1"/>
-          </a:effectRef>
-          <a:fontRef idx="minor">
-            <a:schemeClr val="tx1"/>
-          </a:fontRef>
-        </p:style>
-      </p:cxnSp>
-      <p:sp>
-        <p:nvSpPr>
-          <p:cNvPr id="14" name="Ovale 13"/>
-          <p:cNvSpPr/>
-          <p:nvPr/>
-        </p:nvSpPr>
-        <p:spPr>
-          <a:xfrm>
-            <a:off x="8844214" y="4882291"/>
-            <a:ext cx="1217194" cy="877348"/>
-          </a:xfrm>
-          <a:prstGeom prst="ellipse">
-            <a:avLst/>
-          </a:prstGeom>
-          <a:solidFill>
-            <a:srgbClr val="00B050"/>
-          </a:solidFill>
-          <a:ln>
-            <a:solidFill>
-              <a:schemeClr val="tx1"/>
-            </a:solidFill>
-          </a:ln>
-        </p:spPr>
-        <p:style>
-          <a:lnRef idx="2">
-            <a:schemeClr val="accent1">
-              <a:shade val="50000"/>
-            </a:schemeClr>
-          </a:lnRef>
-          <a:fillRef idx="1">
-            <a:schemeClr val="accent1"/>
-          </a:fillRef>
-          <a:effectRef idx="0">
-            <a:schemeClr val="accent1"/>
-          </a:effectRef>
-          <a:fontRef idx="minor">
-            <a:schemeClr val="lt1"/>
-          </a:fontRef>
-        </p:style>
-        <p:txBody>
-          <a:bodyPr rtlCol="0" anchor="ctr"/>
-          <a:lstStyle/>
-          <a:p>
-            <a:pPr algn="ctr"/>
-            <a:r>
-              <a:rPr lang="it-IT" dirty="0" err="1">
-                <a:latin typeface="Palatino Linotype" panose="02040502050505030304" pitchFamily="18" charset="0"/>
-              </a:rPr>
-              <a:t>Entity</a:t>
-            </a:r>
-            <a:endParaRPr lang="en-GB" dirty="0">
-              <a:latin typeface="Palatino Linotype" panose="02040502050505030304" pitchFamily="18" charset="0"/>
-            </a:endParaRPr>
-          </a:p>
-          <a:p>
-            <a:pPr algn="ctr"/>
-            <a:endParaRPr lang="it-IT" dirty="0">
-              <a:latin typeface="Palatino Linotype" panose="02040502050505030304" pitchFamily="18" charset="0"/>
-            </a:endParaRPr>
-          </a:p>
-        </p:txBody>
-      </p:sp>
-      <p:sp>
-        <p:nvSpPr>
-          <p:cNvPr id="15" name="Rettangolo 14"/>
-          <p:cNvSpPr/>
-          <p:nvPr/>
-        </p:nvSpPr>
-        <p:spPr>
-          <a:xfrm>
-            <a:off x="8201814" y="4634527"/>
-            <a:ext cx="264695" cy="1330128"/>
-          </a:xfrm>
-          <a:prstGeom prst="rect">
-            <a:avLst/>
-          </a:prstGeom>
-        </p:spPr>
-        <p:style>
-          <a:lnRef idx="2">
-            <a:schemeClr val="dk1">
-              <a:shade val="50000"/>
-            </a:schemeClr>
-          </a:lnRef>
-          <a:fillRef idx="1">
-            <a:schemeClr val="dk1"/>
-          </a:fillRef>
-          <a:effectRef idx="0">
-            <a:schemeClr val="dk1"/>
-          </a:effectRef>
-          <a:fontRef idx="minor">
-            <a:schemeClr val="lt1"/>
-          </a:fontRef>
-        </p:style>
-        <p:txBody>
-          <a:bodyPr rtlCol="0" anchor="ctr"/>
-          <a:lstStyle/>
-          <a:p>
-            <a:pPr algn="ctr"/>
-            <a:endParaRPr lang="en-GB"/>
-          </a:p>
-        </p:txBody>
-      </p:sp>
-      <p:sp>
-        <p:nvSpPr>
-          <p:cNvPr id="16" name="Rettangolo 15"/>
-          <p:cNvSpPr/>
-          <p:nvPr/>
-        </p:nvSpPr>
-        <p:spPr>
-          <a:xfrm>
-            <a:off x="3807994" y="4806569"/>
-            <a:ext cx="264695" cy="986043"/>
-          </a:xfrm>
-          <a:prstGeom prst="rect">
-            <a:avLst/>
-          </a:prstGeom>
-        </p:spPr>
-        <p:style>
-          <a:lnRef idx="2">
-            <a:schemeClr val="dk1">
-              <a:shade val="50000"/>
-            </a:schemeClr>
-          </a:lnRef>
-          <a:fillRef idx="1">
-            <a:schemeClr val="dk1"/>
-          </a:fillRef>
-          <a:effectRef idx="0">
-            <a:schemeClr val="dk1"/>
-          </a:effectRef>
-          <a:fontRef idx="minor">
-            <a:schemeClr val="lt1"/>
-          </a:fontRef>
-        </p:style>
-        <p:txBody>
-          <a:bodyPr rtlCol="0" anchor="ctr"/>
-          <a:lstStyle/>
-          <a:p>
-            <a:pPr algn="ctr"/>
-            <a:endParaRPr lang="en-GB"/>
-          </a:p>
-        </p:txBody>
-      </p:sp>
-      <p:cxnSp>
-        <p:nvCxnSpPr>
-          <p:cNvPr id="19" name="Connettore 2 18"/>
-          <p:cNvCxnSpPr/>
-          <p:nvPr/>
-        </p:nvCxnSpPr>
-        <p:spPr>
-          <a:xfrm>
-            <a:off x="8515784" y="4770521"/>
-            <a:ext cx="475247" cy="186489"/>
-          </a:xfrm>
-          <a:prstGeom prst="straightConnector1">
-            <a:avLst/>
-          </a:prstGeom>
-          <a:ln w="28575">
-            <a:solidFill>
-              <a:schemeClr val="tx1"/>
-            </a:solidFill>
-            <a:prstDash val="sysDash"/>
-            <a:tailEnd type="triangle"/>
-          </a:ln>
-        </p:spPr>
-        <p:style>
-          <a:lnRef idx="1">
-            <a:schemeClr val="accent1"/>
-          </a:lnRef>
-          <a:fillRef idx="0">
-            <a:schemeClr val="accent1"/>
-          </a:fillRef>
-          <a:effectRef idx="0">
-            <a:schemeClr val="accent1"/>
-          </a:effectRef>
-          <a:fontRef idx="minor">
-            <a:schemeClr val="tx1"/>
-          </a:fontRef>
-        </p:style>
-      </p:cxnSp>
-      <p:cxnSp>
-        <p:nvCxnSpPr>
-          <p:cNvPr id="20" name="Connettore 2 19"/>
-          <p:cNvCxnSpPr/>
-          <p:nvPr/>
-        </p:nvCxnSpPr>
-        <p:spPr>
-          <a:xfrm flipH="1">
-            <a:off x="8515784" y="5618747"/>
-            <a:ext cx="423679" cy="232001"/>
-          </a:xfrm>
-          <a:prstGeom prst="straightConnector1">
-            <a:avLst/>
-          </a:prstGeom>
-          <a:ln w="28575">
-            <a:solidFill>
-              <a:schemeClr val="tx1"/>
-            </a:solidFill>
-            <a:prstDash val="sysDash"/>
-            <a:tailEnd type="triangle"/>
-          </a:ln>
-        </p:spPr>
-        <p:style>
-          <a:lnRef idx="1">
-            <a:schemeClr val="accent1"/>
-          </a:lnRef>
-          <a:fillRef idx="0">
-            <a:schemeClr val="accent1"/>
-          </a:fillRef>
-          <a:effectRef idx="0">
-            <a:schemeClr val="accent1"/>
-          </a:effectRef>
-          <a:fontRef idx="minor">
-            <a:schemeClr val="tx1"/>
-          </a:fontRef>
-        </p:style>
-      </p:cxnSp>
-      <p:sp>
-        <p:nvSpPr>
-          <p:cNvPr id="24" name="CasellaDiTesto 23"/>
-          <p:cNvSpPr txBox="1"/>
-          <p:nvPr/>
-        </p:nvSpPr>
-        <p:spPr>
-          <a:xfrm>
-            <a:off x="8835765" y="5269287"/>
-            <a:ext cx="1553076" cy="307777"/>
-          </a:xfrm>
-          <a:prstGeom prst="rect">
-            <a:avLst/>
-          </a:prstGeom>
-          <a:noFill/>
-        </p:spPr>
-        <p:txBody>
-          <a:bodyPr wrap="square" rtlCol="0">
-            <a:spAutoFit/>
-          </a:bodyPr>
-          <a:lstStyle/>
-          <a:p>
-            <a:r>
-              <a:rPr lang="it-IT" sz="1400" dirty="0">
-                <a:solidFill>
-                  <a:schemeClr val="bg1"/>
-                </a:solidFill>
-                <a:latin typeface="Palatino Linotype" panose="02040502050505030304" pitchFamily="18" charset="0"/>
-              </a:rPr>
-              <a:t>(</a:t>
-            </a:r>
-            <a:r>
-              <a:rPr lang="it-IT" sz="1400" dirty="0" err="1">
-                <a:solidFill>
-                  <a:schemeClr val="bg1"/>
-                </a:solidFill>
-                <a:latin typeface="Palatino Linotype" panose="02040502050505030304" pitchFamily="18" charset="0"/>
-              </a:rPr>
-              <a:t>raw</a:t>
-            </a:r>
-            <a:r>
-              <a:rPr lang="it-IT" sz="1400" dirty="0">
-                <a:solidFill>
-                  <a:schemeClr val="bg1"/>
-                </a:solidFill>
-                <a:latin typeface="Palatino Linotype" panose="02040502050505030304" pitchFamily="18" charset="0"/>
-              </a:rPr>
-              <a:t> format)</a:t>
-            </a:r>
-            <a:endParaRPr lang="en-GB" sz="1400" dirty="0">
-              <a:solidFill>
-                <a:schemeClr val="bg1"/>
-              </a:solidFill>
-              <a:latin typeface="Palatino Linotype" panose="02040502050505030304" pitchFamily="18" charset="0"/>
-            </a:endParaRPr>
-          </a:p>
-        </p:txBody>
-      </p:sp>
-      <p:sp>
-        <p:nvSpPr>
-          <p:cNvPr id="25" name="Pentagono regolare 24"/>
-          <p:cNvSpPr/>
-          <p:nvPr/>
-        </p:nvSpPr>
-        <p:spPr>
-          <a:xfrm>
-            <a:off x="5075184" y="5047540"/>
-            <a:ext cx="1957564" cy="876830"/>
-          </a:xfrm>
-          <a:prstGeom prst="pentagon">
-            <a:avLst/>
-          </a:prstGeom>
-          <a:solidFill>
-            <a:srgbClr val="00B050"/>
-          </a:solidFill>
-        </p:spPr>
-        <p:style>
-          <a:lnRef idx="2">
-            <a:schemeClr val="accent1">
-              <a:shade val="50000"/>
-            </a:schemeClr>
-          </a:lnRef>
-          <a:fillRef idx="1">
-            <a:schemeClr val="accent1"/>
-          </a:fillRef>
-          <a:effectRef idx="0">
-            <a:schemeClr val="accent1"/>
-          </a:effectRef>
-          <a:fontRef idx="minor">
-            <a:schemeClr val="lt1"/>
-          </a:fontRef>
-        </p:style>
-        <p:txBody>
-          <a:bodyPr rtlCol="0" anchor="ctr"/>
-          <a:lstStyle/>
-          <a:p>
-            <a:pPr algn="ctr"/>
-            <a:endParaRPr lang="en-GB"/>
-          </a:p>
-        </p:txBody>
-      </p:sp>
-      <p:sp>
-        <p:nvSpPr>
-          <p:cNvPr id="13" name="CasellaDiTesto 12"/>
-          <p:cNvSpPr txBox="1"/>
-          <p:nvPr/>
-        </p:nvSpPr>
-        <p:spPr>
-          <a:xfrm>
-            <a:off x="5075183" y="5180682"/>
-            <a:ext cx="1949116" cy="646331"/>
-          </a:xfrm>
-          <a:prstGeom prst="rect">
-            <a:avLst/>
-          </a:prstGeom>
-          <a:noFill/>
-        </p:spPr>
-        <p:txBody>
-          <a:bodyPr wrap="square" rtlCol="0">
-            <a:spAutoFit/>
-          </a:bodyPr>
-          <a:lstStyle/>
-          <a:p>
-            <a:pPr algn="ctr"/>
-            <a:r>
-              <a:rPr lang="it-IT" dirty="0">
-                <a:solidFill>
-                  <a:schemeClr val="bg1"/>
-                </a:solidFill>
-                <a:latin typeface="Palatino Linotype" panose="02040502050505030304" pitchFamily="18" charset="0"/>
-              </a:rPr>
-              <a:t>Resource </a:t>
-            </a:r>
-            <a:r>
-              <a:rPr lang="it-IT" dirty="0" err="1">
-                <a:solidFill>
-                  <a:schemeClr val="bg1"/>
-                </a:solidFill>
-                <a:latin typeface="Palatino Linotype" panose="02040502050505030304" pitchFamily="18" charset="0"/>
-              </a:rPr>
-              <a:t>representation</a:t>
-            </a:r>
-            <a:endParaRPr lang="en-GB" dirty="0">
-              <a:solidFill>
-                <a:schemeClr val="bg1"/>
-              </a:solidFill>
-              <a:latin typeface="Palatino Linotype" panose="02040502050505030304" pitchFamily="18" charset="0"/>
-            </a:endParaRPr>
-          </a:p>
-        </p:txBody>
-      </p:sp>
-      <p:sp>
-        <p:nvSpPr>
-          <p:cNvPr id="6" name="Segnaposto numero diapositiva 5"/>
+              <a:rPr lang="en-GB" dirty="0"/>
+              <a:t>ADD EXAMPLE</a:t>
+            </a:r>
+            <a:endParaRPr lang="en-GB" sz="2400" dirty="0"/>
+          </a:p>
+        </p:txBody>
+      </p:sp>
+      <p:sp>
+        <p:nvSpPr>
+          <p:cNvPr id="4" name="Segnaposto numero diapositiva 3"/>
           <p:cNvSpPr>
             <a:spLocks noGrp="1"/>
           </p:cNvSpPr>
@@ -6420,7 +5817,7 @@
     </p:spTree>
     <p:extLst>
       <p:ext uri="{BB962C8B-B14F-4D97-AF65-F5344CB8AC3E}">
-        <p14:creationId xmlns:p14="http://schemas.microsoft.com/office/powerpoint/2010/main" val="194815998"/>
+        <p14:creationId xmlns:p14="http://schemas.microsoft.com/office/powerpoint/2010/main" val="3491970060"/>
       </p:ext>
     </p:extLst>
   </p:cSld>
@@ -6463,16 +5860,12 @@
           <a:lstStyle/>
           <a:p>
             <a:r>
+              <a:rPr lang="it-IT" dirty="0"/>
+              <a:t>Resource </a:t>
+            </a:r>
+            <a:r>
               <a:rPr lang="it-IT" dirty="0" err="1"/>
-              <a:t>Representations</a:t>
-            </a:r>
-            <a:r>
-              <a:rPr lang="it-IT" dirty="0"/>
-              <a:t>: </a:t>
-            </a:r>
-            <a:r>
-              <a:rPr lang="it-IT" dirty="0" err="1"/>
-              <a:t>example</a:t>
+              <a:t>representations</a:t>
             </a:r>
             <a:endParaRPr lang="en-GB" dirty="0"/>
           </a:p>
@@ -6480,27 +5873,77 @@
       </p:sp>
       <p:sp>
         <p:nvSpPr>
-          <p:cNvPr id="4" name="Ovale 3"/>
+          <p:cNvPr id="3" name="Segnaposto contenuto 2"/>
+          <p:cNvSpPr>
+            <a:spLocks noGrp="1"/>
+          </p:cNvSpPr>
+          <p:nvPr>
+            <p:ph idx="1"/>
+          </p:nvPr>
+        </p:nvSpPr>
+        <p:spPr/>
+        <p:txBody>
+          <a:bodyPr/>
+          <a:lstStyle/>
+          <a:p>
+            <a:r>
+              <a:rPr lang="en-US" b="1" dirty="0"/>
+              <a:t>Resource representation</a:t>
+            </a:r>
+            <a:r>
+              <a:rPr lang="en-US" dirty="0"/>
+              <a:t>: a view of the current state (or realization) of the resource at the time of the request. </a:t>
+            </a:r>
+          </a:p>
+          <a:p>
+            <a:r>
+              <a:rPr lang="en-US" dirty="0"/>
+              <a:t>In a client-server interaction, the client asks to the server a resource (by the resource identifier), and the server answers by sending the corresponding resource representation. </a:t>
+            </a:r>
+          </a:p>
+          <a:p>
+            <a:r>
+              <a:rPr lang="en-US" b="1" dirty="0"/>
+              <a:t>Note</a:t>
+            </a:r>
+            <a:r>
+              <a:rPr lang="en-US" dirty="0"/>
+              <a:t>: The representation sent to the client is not necessarily the same used to store the data in the server.  </a:t>
+            </a:r>
+          </a:p>
+          <a:p>
+            <a:endParaRPr lang="en-GB" dirty="0"/>
+          </a:p>
+        </p:txBody>
+      </p:sp>
+      <p:sp>
+        <p:nvSpPr>
+          <p:cNvPr id="4" name="Rettangolo 3"/>
           <p:cNvSpPr/>
           <p:nvPr/>
         </p:nvSpPr>
         <p:spPr>
           <a:xfrm>
-            <a:off x="428172" y="3164307"/>
-            <a:ext cx="1800000" cy="1800000"/>
-          </a:xfrm>
-          <a:prstGeom prst="ellipse">
-            <a:avLst/>
-          </a:prstGeom>
+            <a:off x="1714500" y="4677276"/>
+            <a:ext cx="2225842" cy="1287379"/>
+          </a:xfrm>
+          <a:prstGeom prst="rect">
+            <a:avLst/>
+          </a:prstGeom>
+          <a:ln w="38100">
+            <a:solidFill>
+              <a:srgbClr val="00B050"/>
+            </a:solidFill>
+          </a:ln>
         </p:spPr>
         <p:style>
-          <a:lnRef idx="1">
+          <a:lnRef idx="2">
             <a:schemeClr val="accent6"/>
           </a:lnRef>
-          <a:fillRef idx="2">
-            <a:schemeClr val="accent6"/>
+          <a:fillRef idx="1">
+            <a:schemeClr val="lt1"/>
           </a:fillRef>
-          <a:effectRef idx="1">
+          <a:effectRef idx="0">
             <a:schemeClr val="accent6"/>
           </a:effectRef>
           <a:fontRef idx="minor">
@@ -6512,51 +5955,13 @@
           <a:lstStyle/>
           <a:p>
             <a:pPr algn="ctr"/>
-            <a:endParaRPr lang="en-GB"/>
-          </a:p>
-        </p:txBody>
-      </p:sp>
-      <p:sp>
-        <p:nvSpPr>
-          <p:cNvPr id="5" name="CasellaDiTesto 4"/>
-          <p:cNvSpPr txBox="1"/>
-          <p:nvPr/>
-        </p:nvSpPr>
-        <p:spPr>
-          <a:xfrm>
-            <a:off x="220215" y="2524154"/>
-            <a:ext cx="2358190" cy="461665"/>
-          </a:xfrm>
-          <a:prstGeom prst="rect">
-            <a:avLst/>
-          </a:prstGeom>
-          <a:noFill/>
-        </p:spPr>
-        <p:txBody>
-          <a:bodyPr wrap="square" rtlCol="0">
-            <a:spAutoFit/>
-          </a:bodyPr>
-          <a:lstStyle/>
-          <a:p>
-            <a:r>
-              <a:rPr lang="it-IT" sz="2400" b="1" dirty="0">
-                <a:latin typeface="Palatino Linotype" panose="02040502050505030304" pitchFamily="18" charset="0"/>
-              </a:rPr>
-              <a:t>Resource</a:t>
-            </a:r>
-            <a:r>
-              <a:rPr lang="it-IT" sz="2400" dirty="0">
-                <a:latin typeface="Palatino Linotype" panose="02040502050505030304" pitchFamily="18" charset="0"/>
-              </a:rPr>
-              <a:t>: </a:t>
-            </a:r>
-            <a:r>
-              <a:rPr lang="it-IT" sz="2400" dirty="0" err="1">
-                <a:latin typeface="Palatino Linotype" panose="02040502050505030304" pitchFamily="18" charset="0"/>
-              </a:rPr>
-              <a:t>circle</a:t>
-            </a:r>
-            <a:endParaRPr lang="en-GB" sz="2400" dirty="0">
+            <a:r>
+              <a:rPr lang="it-IT" sz="2800" dirty="0">
+                <a:latin typeface="Palatino Linotype" panose="02040502050505030304" pitchFamily="18" charset="0"/>
+              </a:rPr>
+              <a:t>Client</a:t>
+            </a:r>
+            <a:endParaRPr lang="en-GB" sz="2800" dirty="0">
               <a:latin typeface="Palatino Linotype" panose="02040502050505030304" pitchFamily="18" charset="0"/>
             </a:endParaRPr>
           </a:p>
@@ -6564,173 +5969,88 @@
       </p:sp>
       <p:sp>
         <p:nvSpPr>
-          <p:cNvPr id="7" name="CasellaDiTesto 6"/>
-          <p:cNvSpPr txBox="1"/>
-          <p:nvPr/>
-        </p:nvSpPr>
-        <p:spPr>
-          <a:xfrm>
-            <a:off x="6671510" y="1441200"/>
-            <a:ext cx="5077325" cy="1015663"/>
-          </a:xfrm>
-          <a:prstGeom prst="rect">
-            <a:avLst/>
-          </a:prstGeom>
-          <a:noFill/>
-        </p:spPr>
-        <p:txBody>
-          <a:bodyPr wrap="square" rtlCol="0">
-            <a:spAutoFit/>
-          </a:bodyPr>
-          <a:lstStyle/>
-          <a:p>
-            <a:pPr algn="ctr"/>
-            <a:r>
-              <a:rPr lang="it-IT" sz="2000" b="1" dirty="0" err="1">
-                <a:latin typeface="Palatino Linotype" panose="02040502050505030304" pitchFamily="18" charset="0"/>
-              </a:rPr>
-              <a:t>Representation</a:t>
-            </a:r>
-            <a:r>
-              <a:rPr lang="it-IT" sz="2000" b="1" dirty="0">
-                <a:latin typeface="Palatino Linotype" panose="02040502050505030304" pitchFamily="18" charset="0"/>
-              </a:rPr>
-              <a:t> 1:</a:t>
-            </a:r>
-            <a:r>
-              <a:rPr lang="it-IT" sz="2000" dirty="0">
-                <a:latin typeface="Palatino Linotype" panose="02040502050505030304" pitchFamily="18" charset="0"/>
-              </a:rPr>
-              <a:t> </a:t>
-            </a:r>
-            <a:r>
-              <a:rPr lang="it-IT" sz="2000" dirty="0" err="1">
-                <a:latin typeface="Palatino Linotype" panose="02040502050505030304" pitchFamily="18" charset="0"/>
-              </a:rPr>
-              <a:t>one</a:t>
-            </a:r>
-            <a:r>
-              <a:rPr lang="it-IT" sz="2000" dirty="0">
-                <a:latin typeface="Palatino Linotype" panose="02040502050505030304" pitchFamily="18" charset="0"/>
-              </a:rPr>
-              <a:t> </a:t>
-            </a:r>
-            <a:r>
-              <a:rPr lang="it-IT" sz="2000" dirty="0" err="1">
-                <a:latin typeface="Palatino Linotype" panose="02040502050505030304" pitchFamily="18" charset="0"/>
-              </a:rPr>
-              <a:t>point</a:t>
-            </a:r>
-            <a:r>
-              <a:rPr lang="it-IT" sz="2000" dirty="0">
-                <a:latin typeface="Palatino Linotype" panose="02040502050505030304" pitchFamily="18" charset="0"/>
-              </a:rPr>
-              <a:t> for the </a:t>
-            </a:r>
-            <a:r>
-              <a:rPr lang="it-IT" sz="2000" dirty="0" err="1">
-                <a:latin typeface="Palatino Linotype" panose="02040502050505030304" pitchFamily="18" charset="0"/>
-              </a:rPr>
-              <a:t>circle</a:t>
-            </a:r>
-            <a:r>
-              <a:rPr lang="it-IT" sz="2000" dirty="0">
-                <a:latin typeface="Palatino Linotype" panose="02040502050505030304" pitchFamily="18" charset="0"/>
-              </a:rPr>
-              <a:t> center and </a:t>
-            </a:r>
-            <a:r>
-              <a:rPr lang="it-IT" sz="2000" dirty="0" err="1">
-                <a:latin typeface="Palatino Linotype" panose="02040502050505030304" pitchFamily="18" charset="0"/>
-              </a:rPr>
-              <a:t>one</a:t>
-            </a:r>
-            <a:r>
-              <a:rPr lang="it-IT" sz="2000" dirty="0">
-                <a:latin typeface="Palatino Linotype" panose="02040502050505030304" pitchFamily="18" charset="0"/>
-              </a:rPr>
-              <a:t> </a:t>
-            </a:r>
-            <a:r>
-              <a:rPr lang="it-IT" sz="2000" dirty="0" err="1">
-                <a:latin typeface="Palatino Linotype" panose="02040502050505030304" pitchFamily="18" charset="0"/>
-              </a:rPr>
-              <a:t>vector</a:t>
-            </a:r>
-            <a:r>
-              <a:rPr lang="it-IT" sz="2000" dirty="0">
-                <a:latin typeface="Palatino Linotype" panose="02040502050505030304" pitchFamily="18" charset="0"/>
-              </a:rPr>
-              <a:t> for the </a:t>
-            </a:r>
-            <a:r>
-              <a:rPr lang="it-IT" sz="2000" dirty="0" err="1">
-                <a:latin typeface="Palatino Linotype" panose="02040502050505030304" pitchFamily="18" charset="0"/>
-              </a:rPr>
-              <a:t>circle</a:t>
-            </a:r>
-            <a:r>
-              <a:rPr lang="it-IT" sz="2000" dirty="0">
-                <a:latin typeface="Palatino Linotype" panose="02040502050505030304" pitchFamily="18" charset="0"/>
-              </a:rPr>
-              <a:t> </a:t>
-            </a:r>
-            <a:r>
-              <a:rPr lang="it-IT" sz="2000" dirty="0" err="1">
-                <a:latin typeface="Palatino Linotype" panose="02040502050505030304" pitchFamily="18" charset="0"/>
-              </a:rPr>
-              <a:t>radius</a:t>
-            </a:r>
-            <a:r>
-              <a:rPr lang="it-IT" sz="2000" dirty="0">
-                <a:latin typeface="Palatino Linotype" panose="02040502050505030304" pitchFamily="18" charset="0"/>
-              </a:rPr>
-              <a:t> in SVG format</a:t>
-            </a:r>
-            <a:endParaRPr lang="en-GB" sz="2000" dirty="0">
-              <a:latin typeface="Palatino Linotype" panose="02040502050505030304" pitchFamily="18" charset="0"/>
-            </a:endParaRPr>
-          </a:p>
-        </p:txBody>
-      </p:sp>
-      <p:sp>
-        <p:nvSpPr>
-          <p:cNvPr id="8" name="Ovale 7"/>
+          <p:cNvPr id="5" name="Rettangolo 4"/>
           <p:cNvSpPr/>
           <p:nvPr/>
         </p:nvSpPr>
         <p:spPr>
           <a:xfrm>
-            <a:off x="3989763" y="3434307"/>
-            <a:ext cx="1260000" cy="1260000"/>
-          </a:xfrm>
-          <a:prstGeom prst="ellipse">
-            <a:avLst/>
-          </a:prstGeom>
+            <a:off x="8339890" y="4265195"/>
+            <a:ext cx="2225842" cy="2111542"/>
+          </a:xfrm>
+          <a:prstGeom prst="rect">
+            <a:avLst/>
+          </a:prstGeom>
+          <a:ln w="38100">
+            <a:solidFill>
+              <a:srgbClr val="00B050"/>
+            </a:solidFill>
+          </a:ln>
         </p:spPr>
         <p:style>
-          <a:lnRef idx="1">
-            <a:schemeClr val="accent4"/>
+          <a:lnRef idx="2">
+            <a:schemeClr val="accent6"/>
           </a:lnRef>
-          <a:fillRef idx="2">
-            <a:schemeClr val="accent4"/>
+          <a:fillRef idx="1">
+            <a:schemeClr val="lt1"/>
           </a:fillRef>
-          <a:effectRef idx="1">
-            <a:schemeClr val="accent4"/>
+          <a:effectRef idx="0">
+            <a:schemeClr val="accent6"/>
           </a:effectRef>
           <a:fontRef idx="minor">
             <a:schemeClr val="dk1"/>
           </a:fontRef>
         </p:style>
         <p:txBody>
-          <a:bodyPr rtlCol="0" anchor="ctr"/>
+          <a:bodyPr rtlCol="0" anchor="t"/>
           <a:lstStyle/>
           <a:p>
             <a:pPr algn="ctr"/>
-            <a:endParaRPr lang="en-GB"/>
-          </a:p>
-        </p:txBody>
-      </p:sp>
+            <a:r>
+              <a:rPr lang="it-IT" sz="2400" dirty="0">
+                <a:latin typeface="Palatino Linotype" panose="02040502050505030304" pitchFamily="18" charset="0"/>
+              </a:rPr>
+              <a:t>Server</a:t>
+            </a:r>
+          </a:p>
+        </p:txBody>
+      </p:sp>
+      <p:cxnSp>
+        <p:nvCxnSpPr>
+          <p:cNvPr id="7" name="Connettore 2 6"/>
+          <p:cNvCxnSpPr/>
+          <p:nvPr/>
+        </p:nvCxnSpPr>
+        <p:spPr>
+          <a:xfrm flipV="1">
+            <a:off x="4421605" y="4746458"/>
+            <a:ext cx="3410953" cy="24063"/>
+          </a:xfrm>
+          <a:prstGeom prst="straightConnector1">
+            <a:avLst/>
+          </a:prstGeom>
+          <a:ln w="28575">
+            <a:solidFill>
+              <a:schemeClr val="tx1"/>
+            </a:solidFill>
+            <a:tailEnd type="triangle"/>
+          </a:ln>
+        </p:spPr>
+        <p:style>
+          <a:lnRef idx="1">
+            <a:schemeClr val="accent1"/>
+          </a:lnRef>
+          <a:fillRef idx="0">
+            <a:schemeClr val="accent1"/>
+          </a:fillRef>
+          <a:effectRef idx="0">
+            <a:schemeClr val="accent1"/>
+          </a:effectRef>
+          <a:fontRef idx="minor">
+            <a:schemeClr val="tx1"/>
+          </a:fontRef>
+        </p:style>
+      </p:cxnSp>
       <p:sp>
         <p:nvSpPr>
           <p:cNvPr id="9" name="CasellaDiTesto 8"/>
@@ -6739,8 +6059,8 @@
         </p:nvSpPr>
         <p:spPr>
           <a:xfrm>
-            <a:off x="3377684" y="2524154"/>
-            <a:ext cx="2358190" cy="830997"/>
+            <a:off x="5075183" y="4310555"/>
+            <a:ext cx="2358190" cy="369332"/>
           </a:xfrm>
           <a:prstGeom prst="rect">
             <a:avLst/>
@@ -6753,139 +6073,80 @@
           </a:bodyPr>
           <a:lstStyle/>
           <a:p>
-            <a:pPr algn="ctr"/>
-            <a:r>
-              <a:rPr lang="it-IT" sz="2400" b="1" dirty="0" err="1">
-                <a:latin typeface="Palatino Linotype" panose="02040502050505030304" pitchFamily="18" charset="0"/>
-              </a:rPr>
-              <a:t>Entity</a:t>
-            </a:r>
-            <a:r>
-              <a:rPr lang="it-IT" sz="2400" dirty="0">
-                <a:latin typeface="Palatino Linotype" panose="02040502050505030304" pitchFamily="18" charset="0"/>
-              </a:rPr>
-              <a:t>: a </a:t>
-            </a:r>
-            <a:r>
-              <a:rPr lang="it-IT" sz="2400" dirty="0" err="1">
-                <a:latin typeface="Palatino Linotype" panose="02040502050505030304" pitchFamily="18" charset="0"/>
-              </a:rPr>
-              <a:t>circle</a:t>
-            </a:r>
-            <a:r>
-              <a:rPr lang="it-IT" sz="2400" dirty="0">
-                <a:latin typeface="Palatino Linotype" panose="02040502050505030304" pitchFamily="18" charset="0"/>
-              </a:rPr>
-              <a:t> </a:t>
-            </a:r>
-            <a:r>
-              <a:rPr lang="it-IT" sz="2400" dirty="0" err="1">
-                <a:latin typeface="Palatino Linotype" panose="02040502050505030304" pitchFamily="18" charset="0"/>
-              </a:rPr>
-              <a:t>realization</a:t>
-            </a:r>
-            <a:endParaRPr lang="en-GB" sz="2400" dirty="0">
+            <a:r>
+              <a:rPr lang="it-IT" dirty="0">
+                <a:latin typeface="Palatino Linotype" panose="02040502050505030304" pitchFamily="18" charset="0"/>
+              </a:rPr>
+              <a:t>Resource </a:t>
+            </a:r>
+            <a:r>
+              <a:rPr lang="it-IT" dirty="0" err="1">
+                <a:latin typeface="Palatino Linotype" panose="02040502050505030304" pitchFamily="18" charset="0"/>
+              </a:rPr>
+              <a:t>identifier</a:t>
+            </a:r>
+            <a:endParaRPr lang="en-GB" dirty="0">
               <a:latin typeface="Palatino Linotype" panose="02040502050505030304" pitchFamily="18" charset="0"/>
             </a:endParaRPr>
           </a:p>
         </p:txBody>
       </p:sp>
-      <p:sp>
-        <p:nvSpPr>
-          <p:cNvPr id="10" name="Ovale 9"/>
+      <p:cxnSp>
+        <p:nvCxnSpPr>
+          <p:cNvPr id="10" name="Connettore 2 9"/>
+          <p:cNvCxnSpPr/>
+          <p:nvPr/>
+        </p:nvCxnSpPr>
+        <p:spPr>
+          <a:xfrm flipH="1">
+            <a:off x="4421605" y="5759639"/>
+            <a:ext cx="3384884" cy="0"/>
+          </a:xfrm>
+          <a:prstGeom prst="straightConnector1">
+            <a:avLst/>
+          </a:prstGeom>
+          <a:ln w="28575">
+            <a:solidFill>
+              <a:schemeClr val="tx1"/>
+            </a:solidFill>
+            <a:tailEnd type="triangle"/>
+          </a:ln>
+        </p:spPr>
+        <p:style>
+          <a:lnRef idx="1">
+            <a:schemeClr val="accent1"/>
+          </a:lnRef>
+          <a:fillRef idx="0">
+            <a:schemeClr val="accent1"/>
+          </a:fillRef>
+          <a:effectRef idx="0">
+            <a:schemeClr val="accent1"/>
+          </a:effectRef>
+          <a:fontRef idx="minor">
+            <a:schemeClr val="tx1"/>
+          </a:fontRef>
+        </p:style>
+      </p:cxnSp>
+      <p:sp>
+        <p:nvSpPr>
+          <p:cNvPr id="14" name="Ovale 13"/>
           <p:cNvSpPr/>
           <p:nvPr/>
         </p:nvSpPr>
         <p:spPr>
           <a:xfrm>
-            <a:off x="8547038" y="2510291"/>
-            <a:ext cx="1260000" cy="1260000"/>
+            <a:off x="8844214" y="4882291"/>
+            <a:ext cx="1217194" cy="877348"/>
           </a:xfrm>
           <a:prstGeom prst="ellipse">
             <a:avLst/>
           </a:prstGeom>
-        </p:spPr>
-        <p:style>
-          <a:lnRef idx="1">
-            <a:schemeClr val="accent4"/>
-          </a:lnRef>
-          <a:fillRef idx="2">
-            <a:schemeClr val="accent4"/>
-          </a:fillRef>
-          <a:effectRef idx="1">
-            <a:schemeClr val="accent4"/>
-          </a:effectRef>
-          <a:fontRef idx="minor">
-            <a:schemeClr val="dk1"/>
-          </a:fontRef>
-        </p:style>
-        <p:txBody>
-          <a:bodyPr rtlCol="0" anchor="ctr"/>
-          <a:lstStyle/>
-          <a:p>
-            <a:pPr algn="ctr"/>
-            <a:endParaRPr lang="en-GB"/>
-          </a:p>
-        </p:txBody>
-      </p:sp>
-      <p:sp>
-        <p:nvSpPr>
-          <p:cNvPr id="11" name="Ovale 10"/>
-          <p:cNvSpPr/>
-          <p:nvPr/>
-        </p:nvSpPr>
-        <p:spPr>
-          <a:xfrm>
-            <a:off x="8504927" y="4979805"/>
-            <a:ext cx="1260000" cy="1260000"/>
-          </a:xfrm>
-          <a:prstGeom prst="ellipse">
-            <a:avLst/>
-          </a:prstGeom>
-        </p:spPr>
-        <p:style>
-          <a:lnRef idx="1">
-            <a:schemeClr val="accent4"/>
-          </a:lnRef>
-          <a:fillRef idx="2">
-            <a:schemeClr val="accent4"/>
-          </a:fillRef>
-          <a:effectRef idx="1">
-            <a:schemeClr val="accent4"/>
-          </a:effectRef>
-          <a:fontRef idx="minor">
-            <a:schemeClr val="dk1"/>
-          </a:fontRef>
-        </p:style>
-        <p:txBody>
-          <a:bodyPr rtlCol="0" anchor="ctr"/>
-          <a:lstStyle/>
-          <a:p>
-            <a:pPr algn="ctr"/>
-            <a:endParaRPr lang="en-GB"/>
-          </a:p>
-        </p:txBody>
-      </p:sp>
-      <p:sp>
-        <p:nvSpPr>
-          <p:cNvPr id="12" name="Ovale 11"/>
-          <p:cNvSpPr/>
-          <p:nvPr/>
-        </p:nvSpPr>
-        <p:spPr>
-          <a:xfrm>
-            <a:off x="9141038" y="3104291"/>
-            <a:ext cx="72000" cy="72000"/>
-          </a:xfrm>
-          <a:prstGeom prst="ellipse">
-            <a:avLst/>
-          </a:prstGeom>
           <a:solidFill>
-            <a:srgbClr val="C00000"/>
+            <a:srgbClr val="00B050"/>
           </a:solidFill>
           <a:ln>
             <a:solidFill>
-              <a:srgbClr val="C00000"/>
+              <a:schemeClr val="tx1"/>
             </a:solidFill>
           </a:ln>
         </p:spPr>
@@ -6910,83 +6171,50 @@
           <a:lstStyle/>
           <a:p>
             <a:pPr algn="ctr"/>
-            <a:endParaRPr lang="en-GB"/>
-          </a:p>
-        </p:txBody>
-      </p:sp>
-      <p:cxnSp>
-        <p:nvCxnSpPr>
-          <p:cNvPr id="14" name="Connettore diritto 13"/>
-          <p:cNvCxnSpPr>
-            <a:stCxn id="12" idx="7"/>
-            <a:endCxn id="10" idx="7"/>
-          </p:cNvCxnSpPr>
-          <p:nvPr/>
-        </p:nvCxnSpPr>
-        <p:spPr>
-          <a:xfrm flipV="1">
-            <a:off x="9202494" y="2694814"/>
-            <a:ext cx="420021" cy="420021"/>
-          </a:xfrm>
-          <a:prstGeom prst="line">
-            <a:avLst/>
-          </a:prstGeom>
-          <a:ln w="19050">
-            <a:solidFill>
-              <a:srgbClr val="C00000"/>
-            </a:solidFill>
-            <a:prstDash val="dash"/>
-          </a:ln>
-        </p:spPr>
-        <p:style>
-          <a:lnRef idx="1">
-            <a:schemeClr val="accent1"/>
-          </a:lnRef>
-          <a:fillRef idx="0">
-            <a:schemeClr val="accent1"/>
-          </a:fillRef>
-          <a:effectRef idx="0">
-            <a:schemeClr val="accent1"/>
-          </a:effectRef>
-          <a:fontRef idx="minor">
-            <a:schemeClr val="tx1"/>
-          </a:fontRef>
-        </p:style>
-      </p:cxnSp>
-      <p:sp>
-        <p:nvSpPr>
-          <p:cNvPr id="15" name="Ovale 14"/>
+            <a:r>
+              <a:rPr lang="it-IT" dirty="0" err="1">
+                <a:latin typeface="Palatino Linotype" panose="02040502050505030304" pitchFamily="18" charset="0"/>
+              </a:rPr>
+              <a:t>Entity</a:t>
+            </a:r>
+            <a:endParaRPr lang="en-GB" dirty="0">
+              <a:latin typeface="Palatino Linotype" panose="02040502050505030304" pitchFamily="18" charset="0"/>
+            </a:endParaRPr>
+          </a:p>
+          <a:p>
+            <a:pPr algn="ctr"/>
+            <a:endParaRPr lang="it-IT" dirty="0">
+              <a:latin typeface="Palatino Linotype" panose="02040502050505030304" pitchFamily="18" charset="0"/>
+            </a:endParaRPr>
+          </a:p>
+        </p:txBody>
+      </p:sp>
+      <p:sp>
+        <p:nvSpPr>
+          <p:cNvPr id="15" name="Rettangolo 14"/>
           <p:cNvSpPr/>
           <p:nvPr/>
         </p:nvSpPr>
         <p:spPr>
           <a:xfrm>
-            <a:off x="8679827" y="5128637"/>
-            <a:ext cx="72000" cy="72000"/>
-          </a:xfrm>
-          <a:prstGeom prst="ellipse">
-            <a:avLst/>
-          </a:prstGeom>
-          <a:solidFill>
-            <a:srgbClr val="C00000"/>
-          </a:solidFill>
-          <a:ln>
-            <a:solidFill>
-              <a:srgbClr val="C00000"/>
-            </a:solidFill>
-          </a:ln>
+            <a:off x="8201814" y="4634527"/>
+            <a:ext cx="264695" cy="1330128"/>
+          </a:xfrm>
+          <a:prstGeom prst="rect">
+            <a:avLst/>
+          </a:prstGeom>
         </p:spPr>
         <p:style>
           <a:lnRef idx="2">
-            <a:schemeClr val="accent1">
+            <a:schemeClr val="dk1">
               <a:shade val="50000"/>
             </a:schemeClr>
           </a:lnRef>
           <a:fillRef idx="1">
-            <a:schemeClr val="accent1"/>
+            <a:schemeClr val="dk1"/>
           </a:fillRef>
           <a:effectRef idx="0">
-            <a:schemeClr val="accent1"/>
+            <a:schemeClr val="dk1"/>
           </a:effectRef>
           <a:fontRef idx="minor">
             <a:schemeClr val="lt1"/>
@@ -7003,38 +6231,30 @@
       </p:sp>
       <p:sp>
         <p:nvSpPr>
-          <p:cNvPr id="16" name="Ovale 15"/>
+          <p:cNvPr id="16" name="Rettangolo 15"/>
           <p:cNvSpPr/>
           <p:nvPr/>
         </p:nvSpPr>
         <p:spPr>
           <a:xfrm>
-            <a:off x="8848269" y="6149757"/>
-            <a:ext cx="72000" cy="72000"/>
-          </a:xfrm>
-          <a:prstGeom prst="ellipse">
-            <a:avLst/>
-          </a:prstGeom>
-          <a:solidFill>
-            <a:srgbClr val="C00000"/>
-          </a:solidFill>
-          <a:ln>
-            <a:solidFill>
-              <a:srgbClr val="C00000"/>
-            </a:solidFill>
-          </a:ln>
+            <a:off x="3807994" y="4806569"/>
+            <a:ext cx="264695" cy="986043"/>
+          </a:xfrm>
+          <a:prstGeom prst="rect">
+            <a:avLst/>
+          </a:prstGeom>
         </p:spPr>
         <p:style>
           <a:lnRef idx="2">
-            <a:schemeClr val="accent1">
+            <a:schemeClr val="dk1">
               <a:shade val="50000"/>
             </a:schemeClr>
           </a:lnRef>
           <a:fillRef idx="1">
-            <a:schemeClr val="accent1"/>
+            <a:schemeClr val="dk1"/>
           </a:fillRef>
           <a:effectRef idx="0">
-            <a:schemeClr val="accent1"/>
+            <a:schemeClr val="dk1"/>
           </a:effectRef>
           <a:fontRef idx="minor">
             <a:schemeClr val="lt1"/>
@@ -7049,179 +6269,25 @@
           </a:p>
         </p:txBody>
       </p:sp>
-      <p:sp>
-        <p:nvSpPr>
-          <p:cNvPr id="17" name="Ovale 16"/>
-          <p:cNvSpPr/>
-          <p:nvPr/>
-        </p:nvSpPr>
-        <p:spPr>
-          <a:xfrm>
-            <a:off x="9588210" y="5182786"/>
-            <a:ext cx="72000" cy="72000"/>
-          </a:xfrm>
-          <a:prstGeom prst="ellipse">
-            <a:avLst/>
-          </a:prstGeom>
-          <a:solidFill>
-            <a:srgbClr val="C00000"/>
-          </a:solidFill>
-          <a:ln>
-            <a:solidFill>
-              <a:srgbClr val="C00000"/>
-            </a:solidFill>
-          </a:ln>
-        </p:spPr>
-        <p:style>
-          <a:lnRef idx="2">
-            <a:schemeClr val="accent1">
-              <a:shade val="50000"/>
-            </a:schemeClr>
-          </a:lnRef>
-          <a:fillRef idx="1">
-            <a:schemeClr val="accent1"/>
-          </a:fillRef>
-          <a:effectRef idx="0">
-            <a:schemeClr val="accent1"/>
-          </a:effectRef>
-          <a:fontRef idx="minor">
-            <a:schemeClr val="lt1"/>
-          </a:fontRef>
-        </p:style>
-        <p:txBody>
-          <a:bodyPr rtlCol="0" anchor="ctr"/>
-          <a:lstStyle/>
-          <a:p>
-            <a:pPr algn="ctr"/>
-            <a:endParaRPr lang="en-GB"/>
-          </a:p>
-        </p:txBody>
-      </p:sp>
-      <p:sp>
-        <p:nvSpPr>
-          <p:cNvPr id="18" name="CasellaDiTesto 17"/>
-          <p:cNvSpPr txBox="1"/>
-          <p:nvPr/>
-        </p:nvSpPr>
-        <p:spPr>
-          <a:xfrm>
-            <a:off x="6701589" y="4168113"/>
-            <a:ext cx="5017169" cy="707886"/>
-          </a:xfrm>
-          <a:prstGeom prst="rect">
-            <a:avLst/>
-          </a:prstGeom>
-          <a:noFill/>
-        </p:spPr>
-        <p:txBody>
-          <a:bodyPr wrap="square" rtlCol="0">
-            <a:spAutoFit/>
-          </a:bodyPr>
-          <a:lstStyle/>
-          <a:p>
-            <a:pPr algn="ctr"/>
-            <a:r>
-              <a:rPr lang="it-IT" sz="2000" b="1" dirty="0" err="1">
-                <a:latin typeface="Palatino Linotype" panose="02040502050505030304" pitchFamily="18" charset="0"/>
-              </a:rPr>
-              <a:t>Representation</a:t>
-            </a:r>
-            <a:r>
-              <a:rPr lang="it-IT" sz="2000" b="1" dirty="0">
-                <a:latin typeface="Palatino Linotype" panose="02040502050505030304" pitchFamily="18" charset="0"/>
-              </a:rPr>
-              <a:t> 2</a:t>
-            </a:r>
-            <a:r>
-              <a:rPr lang="it-IT" sz="2000" dirty="0">
-                <a:latin typeface="Palatino Linotype" panose="02040502050505030304" pitchFamily="18" charset="0"/>
-              </a:rPr>
-              <a:t>: </a:t>
-            </a:r>
-            <a:r>
-              <a:rPr lang="it-IT" sz="2000" dirty="0" err="1">
-                <a:latin typeface="Palatino Linotype" panose="02040502050505030304" pitchFamily="18" charset="0"/>
-              </a:rPr>
-              <a:t>coordinates</a:t>
-            </a:r>
-            <a:r>
-              <a:rPr lang="it-IT" sz="2000" dirty="0">
-                <a:latin typeface="Palatino Linotype" panose="02040502050505030304" pitchFamily="18" charset="0"/>
-              </a:rPr>
-              <a:t> of </a:t>
-            </a:r>
-            <a:r>
-              <a:rPr lang="it-IT" sz="2000" dirty="0" err="1">
-                <a:latin typeface="Palatino Linotype" panose="02040502050505030304" pitchFamily="18" charset="0"/>
-              </a:rPr>
-              <a:t>three</a:t>
-            </a:r>
-            <a:r>
-              <a:rPr lang="it-IT" sz="2000" dirty="0">
-                <a:latin typeface="Palatino Linotype" panose="02040502050505030304" pitchFamily="18" charset="0"/>
-              </a:rPr>
-              <a:t> </a:t>
-            </a:r>
-            <a:r>
-              <a:rPr lang="it-IT" sz="2000" dirty="0" err="1">
-                <a:latin typeface="Palatino Linotype" panose="02040502050505030304" pitchFamily="18" charset="0"/>
-              </a:rPr>
-              <a:t>points</a:t>
-            </a:r>
-            <a:r>
-              <a:rPr lang="it-IT" sz="2000" dirty="0">
-                <a:latin typeface="Palatino Linotype" panose="02040502050505030304" pitchFamily="18" charset="0"/>
-              </a:rPr>
-              <a:t> of the </a:t>
-            </a:r>
-            <a:r>
-              <a:rPr lang="it-IT" sz="2000" dirty="0" err="1">
-                <a:latin typeface="Palatino Linotype" panose="02040502050505030304" pitchFamily="18" charset="0"/>
-              </a:rPr>
-              <a:t>circumference</a:t>
-            </a:r>
-            <a:r>
-              <a:rPr lang="it-IT" sz="2000" dirty="0">
-                <a:latin typeface="Palatino Linotype" panose="02040502050505030304" pitchFamily="18" charset="0"/>
-              </a:rPr>
-              <a:t> in a </a:t>
-            </a:r>
-            <a:r>
-              <a:rPr lang="it-IT" sz="2000" dirty="0" err="1">
-                <a:latin typeface="Palatino Linotype" panose="02040502050505030304" pitchFamily="18" charset="0"/>
-              </a:rPr>
-              <a:t>csv</a:t>
-            </a:r>
-            <a:r>
-              <a:rPr lang="it-IT" sz="2000" dirty="0">
-                <a:latin typeface="Palatino Linotype" panose="02040502050505030304" pitchFamily="18" charset="0"/>
-              </a:rPr>
-              <a:t> file</a:t>
-            </a:r>
-            <a:endParaRPr lang="en-GB" sz="2000" dirty="0">
-              <a:latin typeface="Palatino Linotype" panose="02040502050505030304" pitchFamily="18" charset="0"/>
-            </a:endParaRPr>
-          </a:p>
-        </p:txBody>
-      </p:sp>
       <p:cxnSp>
         <p:nvCxnSpPr>
-          <p:cNvPr id="20" name="Connettore 2 19"/>
+          <p:cNvPr id="19" name="Connettore 2 18"/>
           <p:cNvCxnSpPr/>
           <p:nvPr/>
         </p:nvCxnSpPr>
         <p:spPr>
-          <a:xfrm flipV="1">
-            <a:off x="5648826" y="2316080"/>
-            <a:ext cx="1052763" cy="848227"/>
+          <a:xfrm>
+            <a:off x="8515784" y="4770521"/>
+            <a:ext cx="475247" cy="186489"/>
           </a:xfrm>
           <a:prstGeom prst="straightConnector1">
             <a:avLst/>
           </a:prstGeom>
-          <a:ln w="57150">
+          <a:ln w="28575">
             <a:solidFill>
               <a:schemeClr val="tx1"/>
             </a:solidFill>
+            <a:prstDash val="sysDash"/>
             <a:tailEnd type="triangle"/>
           </a:ln>
         </p:spPr>
@@ -7242,22 +6308,23 @@
       </p:cxnSp>
       <p:cxnSp>
         <p:nvCxnSpPr>
-          <p:cNvPr id="21" name="Connettore 2 20"/>
+          <p:cNvPr id="20" name="Connettore 2 19"/>
           <p:cNvCxnSpPr/>
           <p:nvPr/>
         </p:nvCxnSpPr>
         <p:spPr>
-          <a:xfrm>
-            <a:off x="5648826" y="4168114"/>
-            <a:ext cx="1221206" cy="353942"/>
+          <a:xfrm flipH="1">
+            <a:off x="8515784" y="5618747"/>
+            <a:ext cx="423679" cy="232001"/>
           </a:xfrm>
           <a:prstGeom prst="straightConnector1">
             <a:avLst/>
           </a:prstGeom>
-          <a:ln w="57150">
+          <a:ln w="28575">
             <a:solidFill>
               <a:schemeClr val="tx1"/>
             </a:solidFill>
+            <a:prstDash val="sysDash"/>
             <a:tailEnd type="triangle"/>
           </a:ln>
         </p:spPr>
@@ -7278,7 +6345,158 @@
       </p:cxnSp>
       <p:sp>
         <p:nvSpPr>
-          <p:cNvPr id="3" name="Segnaposto numero diapositiva 2"/>
+          <p:cNvPr id="24" name="CasellaDiTesto 23"/>
+          <p:cNvSpPr txBox="1"/>
+          <p:nvPr/>
+        </p:nvSpPr>
+        <p:spPr>
+          <a:xfrm>
+            <a:off x="8835765" y="5269287"/>
+            <a:ext cx="1553076" cy="307777"/>
+          </a:xfrm>
+          <a:prstGeom prst="rect">
+            <a:avLst/>
+          </a:prstGeom>
+          <a:noFill/>
+        </p:spPr>
+        <p:txBody>
+          <a:bodyPr wrap="square" rtlCol="0">
+            <a:spAutoFit/>
+          </a:bodyPr>
+          <a:lstStyle/>
+          <a:p>
+            <a:r>
+              <a:rPr lang="it-IT" sz="1400" dirty="0">
+                <a:solidFill>
+                  <a:schemeClr val="bg1"/>
+                </a:solidFill>
+                <a:latin typeface="Palatino Linotype" panose="02040502050505030304" pitchFamily="18" charset="0"/>
+              </a:rPr>
+              <a:t>(</a:t>
+            </a:r>
+            <a:r>
+              <a:rPr lang="it-IT" sz="1400" dirty="0" err="1">
+                <a:solidFill>
+                  <a:schemeClr val="bg1"/>
+                </a:solidFill>
+                <a:latin typeface="Palatino Linotype" panose="02040502050505030304" pitchFamily="18" charset="0"/>
+              </a:rPr>
+              <a:t>raw</a:t>
+            </a:r>
+            <a:r>
+              <a:rPr lang="it-IT" sz="1400" dirty="0">
+                <a:solidFill>
+                  <a:schemeClr val="bg1"/>
+                </a:solidFill>
+                <a:latin typeface="Palatino Linotype" panose="02040502050505030304" pitchFamily="18" charset="0"/>
+              </a:rPr>
+              <a:t> format)</a:t>
+            </a:r>
+            <a:endParaRPr lang="en-GB" sz="1400" dirty="0">
+              <a:solidFill>
+                <a:schemeClr val="bg1"/>
+              </a:solidFill>
+              <a:latin typeface="Palatino Linotype" panose="02040502050505030304" pitchFamily="18" charset="0"/>
+            </a:endParaRPr>
+          </a:p>
+        </p:txBody>
+      </p:sp>
+      <p:sp>
+        <p:nvSpPr>
+          <p:cNvPr id="25" name="Pentagono regolare 24"/>
+          <p:cNvSpPr/>
+          <p:nvPr/>
+        </p:nvSpPr>
+        <p:spPr>
+          <a:xfrm>
+            <a:off x="5075184" y="5047540"/>
+            <a:ext cx="1957564" cy="876830"/>
+          </a:xfrm>
+          <a:prstGeom prst="pentagon">
+            <a:avLst/>
+          </a:prstGeom>
+          <a:solidFill>
+            <a:srgbClr val="00B050"/>
+          </a:solidFill>
+        </p:spPr>
+        <p:style>
+          <a:lnRef idx="2">
+            <a:schemeClr val="accent1">
+              <a:shade val="50000"/>
+            </a:schemeClr>
+          </a:lnRef>
+          <a:fillRef idx="1">
+            <a:schemeClr val="accent1"/>
+          </a:fillRef>
+          <a:effectRef idx="0">
+            <a:schemeClr val="accent1"/>
+          </a:effectRef>
+          <a:fontRef idx="minor">
+            <a:schemeClr val="lt1"/>
+          </a:fontRef>
+        </p:style>
+        <p:txBody>
+          <a:bodyPr rtlCol="0" anchor="ctr"/>
+          <a:lstStyle/>
+          <a:p>
+            <a:pPr algn="ctr"/>
+            <a:endParaRPr lang="en-GB"/>
+          </a:p>
+        </p:txBody>
+      </p:sp>
+      <p:sp>
+        <p:nvSpPr>
+          <p:cNvPr id="13" name="CasellaDiTesto 12"/>
+          <p:cNvSpPr txBox="1"/>
+          <p:nvPr/>
+        </p:nvSpPr>
+        <p:spPr>
+          <a:xfrm>
+            <a:off x="5075183" y="5180682"/>
+            <a:ext cx="1949116" cy="646331"/>
+          </a:xfrm>
+          <a:prstGeom prst="rect">
+            <a:avLst/>
+          </a:prstGeom>
+          <a:noFill/>
+        </p:spPr>
+        <p:txBody>
+          <a:bodyPr wrap="square" rtlCol="0">
+            <a:spAutoFit/>
+          </a:bodyPr>
+          <a:lstStyle/>
+          <a:p>
+            <a:pPr algn="ctr"/>
+            <a:r>
+              <a:rPr lang="it-IT" dirty="0">
+                <a:solidFill>
+                  <a:schemeClr val="bg1"/>
+                </a:solidFill>
+                <a:latin typeface="Palatino Linotype" panose="02040502050505030304" pitchFamily="18" charset="0"/>
+              </a:rPr>
+              <a:t>Resource </a:t>
+            </a:r>
+            <a:r>
+              <a:rPr lang="it-IT" dirty="0" err="1">
+                <a:solidFill>
+                  <a:schemeClr val="bg1"/>
+                </a:solidFill>
+                <a:latin typeface="Palatino Linotype" panose="02040502050505030304" pitchFamily="18" charset="0"/>
+              </a:rPr>
+              <a:t>representation</a:t>
+            </a:r>
+            <a:endParaRPr lang="en-GB" dirty="0">
+              <a:solidFill>
+                <a:schemeClr val="bg1"/>
+              </a:solidFill>
+              <a:latin typeface="Palatino Linotype" panose="02040502050505030304" pitchFamily="18" charset="0"/>
+            </a:endParaRPr>
+          </a:p>
+        </p:txBody>
+      </p:sp>
+      <p:sp>
+        <p:nvSpPr>
+          <p:cNvPr id="6" name="Segnaposto numero diapositiva 5"/>
           <p:cNvSpPr>
             <a:spLocks noGrp="1"/>
           </p:cNvSpPr>
@@ -7302,7 +6520,7 @@
     </p:spTree>
     <p:extLst>
       <p:ext uri="{BB962C8B-B14F-4D97-AF65-F5344CB8AC3E}">
-        <p14:creationId xmlns:p14="http://schemas.microsoft.com/office/powerpoint/2010/main" val="2761484841"/>
+        <p14:creationId xmlns:p14="http://schemas.microsoft.com/office/powerpoint/2010/main" val="194815998"/>
       </p:ext>
     </p:extLst>
   </p:cSld>
@@ -7534,20 +6752,16 @@
           <a:lstStyle/>
           <a:p>
             <a:r>
+              <a:rPr lang="it-IT" dirty="0" err="1"/>
+              <a:t>Representations</a:t>
+            </a:r>
+            <a:r>
               <a:rPr lang="it-IT" dirty="0"/>
-              <a:t>REST self-</a:t>
+              <a:t>: </a:t>
             </a:r>
             <a:r>
               <a:rPr lang="it-IT" dirty="0" err="1"/>
-              <a:t>descriptive</a:t>
-            </a:r>
-            <a:r>
-              <a:rPr lang="it-IT" dirty="0"/>
-              <a:t> </a:t>
-            </a:r>
-            <a:r>
-              <a:rPr lang="it-IT" dirty="0" err="1"/>
-              <a:t>messages</a:t>
+              <a:t>example</a:t>
             </a:r>
             <a:endParaRPr lang="en-GB" dirty="0"/>
           </a:p>
@@ -7555,32 +6769,27 @@
       </p:sp>
       <p:sp>
         <p:nvSpPr>
-          <p:cNvPr id="4" name="Rettangolo 3"/>
+          <p:cNvPr id="4" name="Ovale 3"/>
           <p:cNvSpPr/>
           <p:nvPr/>
         </p:nvSpPr>
         <p:spPr>
           <a:xfrm>
-            <a:off x="473459" y="3308140"/>
-            <a:ext cx="2225842" cy="1287379"/>
-          </a:xfrm>
-          <a:prstGeom prst="rect">
-            <a:avLst/>
-          </a:prstGeom>
-          <a:ln w="38100">
-            <a:solidFill>
-              <a:srgbClr val="00B050"/>
-            </a:solidFill>
-          </a:ln>
+            <a:off x="428172" y="3164307"/>
+            <a:ext cx="1800000" cy="1800000"/>
+          </a:xfrm>
+          <a:prstGeom prst="ellipse">
+            <a:avLst/>
+          </a:prstGeom>
         </p:spPr>
         <p:style>
-          <a:lnRef idx="2">
+          <a:lnRef idx="1">
             <a:schemeClr val="accent6"/>
           </a:lnRef>
-          <a:fillRef idx="1">
-            <a:schemeClr val="lt1"/>
+          <a:fillRef idx="2">
+            <a:schemeClr val="accent6"/>
           </a:fillRef>
-          <a:effectRef idx="0">
+          <a:effectRef idx="1">
             <a:schemeClr val="accent6"/>
           </a:effectRef>
           <a:fontRef idx="minor">
@@ -7592,13 +6801,51 @@
           <a:lstStyle/>
           <a:p>
             <a:pPr algn="ctr"/>
-            <a:r>
-              <a:rPr lang="it-IT" sz="2800" dirty="0">
-                <a:latin typeface="Palatino Linotype" panose="02040502050505030304" pitchFamily="18" charset="0"/>
-              </a:rPr>
-              <a:t>Client</a:t>
-            </a:r>
-            <a:endParaRPr lang="en-GB" sz="2800" dirty="0">
+            <a:endParaRPr lang="en-GB"/>
+          </a:p>
+        </p:txBody>
+      </p:sp>
+      <p:sp>
+        <p:nvSpPr>
+          <p:cNvPr id="5" name="CasellaDiTesto 4"/>
+          <p:cNvSpPr txBox="1"/>
+          <p:nvPr/>
+        </p:nvSpPr>
+        <p:spPr>
+          <a:xfrm>
+            <a:off x="220215" y="2524154"/>
+            <a:ext cx="2358190" cy="461665"/>
+          </a:xfrm>
+          <a:prstGeom prst="rect">
+            <a:avLst/>
+          </a:prstGeom>
+          <a:noFill/>
+        </p:spPr>
+        <p:txBody>
+          <a:bodyPr wrap="square" rtlCol="0">
+            <a:spAutoFit/>
+          </a:bodyPr>
+          <a:lstStyle/>
+          <a:p>
+            <a:r>
+              <a:rPr lang="it-IT" sz="2400" b="1" dirty="0">
+                <a:latin typeface="Palatino Linotype" panose="02040502050505030304" pitchFamily="18" charset="0"/>
+              </a:rPr>
+              <a:t>Resource</a:t>
+            </a:r>
+            <a:r>
+              <a:rPr lang="it-IT" sz="2400" dirty="0">
+                <a:latin typeface="Palatino Linotype" panose="02040502050505030304" pitchFamily="18" charset="0"/>
+              </a:rPr>
+              <a:t>: </a:t>
+            </a:r>
+            <a:r>
+              <a:rPr lang="it-IT" sz="2400" dirty="0" err="1">
+                <a:latin typeface="Palatino Linotype" panose="02040502050505030304" pitchFamily="18" charset="0"/>
+              </a:rPr>
+              <a:t>circle</a:t>
+            </a:r>
+            <a:endParaRPr lang="en-GB" sz="2400" dirty="0">
               <a:latin typeface="Palatino Linotype" panose="02040502050505030304" pitchFamily="18" charset="0"/>
             </a:endParaRPr>
           </a:p>
@@ -7606,67 +6853,661 @@
       </p:sp>
       <p:sp>
         <p:nvSpPr>
-          <p:cNvPr id="5" name="Rettangolo 4"/>
+          <p:cNvPr id="7" name="CasellaDiTesto 6"/>
+          <p:cNvSpPr txBox="1"/>
+          <p:nvPr/>
+        </p:nvSpPr>
+        <p:spPr>
+          <a:xfrm>
+            <a:off x="6671510" y="1441200"/>
+            <a:ext cx="5077325" cy="1015663"/>
+          </a:xfrm>
+          <a:prstGeom prst="rect">
+            <a:avLst/>
+          </a:prstGeom>
+          <a:noFill/>
+        </p:spPr>
+        <p:txBody>
+          <a:bodyPr wrap="square" rtlCol="0">
+            <a:spAutoFit/>
+          </a:bodyPr>
+          <a:lstStyle/>
+          <a:p>
+            <a:pPr algn="ctr"/>
+            <a:r>
+              <a:rPr lang="it-IT" sz="2000" b="1" dirty="0" err="1">
+                <a:latin typeface="Palatino Linotype" panose="02040502050505030304" pitchFamily="18" charset="0"/>
+              </a:rPr>
+              <a:t>Representation</a:t>
+            </a:r>
+            <a:r>
+              <a:rPr lang="it-IT" sz="2000" b="1" dirty="0">
+                <a:latin typeface="Palatino Linotype" panose="02040502050505030304" pitchFamily="18" charset="0"/>
+              </a:rPr>
+              <a:t> 1:</a:t>
+            </a:r>
+            <a:r>
+              <a:rPr lang="it-IT" sz="2000" dirty="0">
+                <a:latin typeface="Palatino Linotype" panose="02040502050505030304" pitchFamily="18" charset="0"/>
+              </a:rPr>
+              <a:t> </a:t>
+            </a:r>
+            <a:r>
+              <a:rPr lang="it-IT" sz="2000" dirty="0" err="1">
+                <a:latin typeface="Palatino Linotype" panose="02040502050505030304" pitchFamily="18" charset="0"/>
+              </a:rPr>
+              <a:t>one</a:t>
+            </a:r>
+            <a:r>
+              <a:rPr lang="it-IT" sz="2000" dirty="0">
+                <a:latin typeface="Palatino Linotype" panose="02040502050505030304" pitchFamily="18" charset="0"/>
+              </a:rPr>
+              <a:t> </a:t>
+            </a:r>
+            <a:r>
+              <a:rPr lang="it-IT" sz="2000" dirty="0" err="1">
+                <a:latin typeface="Palatino Linotype" panose="02040502050505030304" pitchFamily="18" charset="0"/>
+              </a:rPr>
+              <a:t>point</a:t>
+            </a:r>
+            <a:r>
+              <a:rPr lang="it-IT" sz="2000" dirty="0">
+                <a:latin typeface="Palatino Linotype" panose="02040502050505030304" pitchFamily="18" charset="0"/>
+              </a:rPr>
+              <a:t> for the </a:t>
+            </a:r>
+            <a:r>
+              <a:rPr lang="it-IT" sz="2000" dirty="0" err="1">
+                <a:latin typeface="Palatino Linotype" panose="02040502050505030304" pitchFamily="18" charset="0"/>
+              </a:rPr>
+              <a:t>circle</a:t>
+            </a:r>
+            <a:r>
+              <a:rPr lang="it-IT" sz="2000" dirty="0">
+                <a:latin typeface="Palatino Linotype" panose="02040502050505030304" pitchFamily="18" charset="0"/>
+              </a:rPr>
+              <a:t> center and </a:t>
+            </a:r>
+            <a:r>
+              <a:rPr lang="it-IT" sz="2000" dirty="0" err="1">
+                <a:latin typeface="Palatino Linotype" panose="02040502050505030304" pitchFamily="18" charset="0"/>
+              </a:rPr>
+              <a:t>one</a:t>
+            </a:r>
+            <a:r>
+              <a:rPr lang="it-IT" sz="2000" dirty="0">
+                <a:latin typeface="Palatino Linotype" panose="02040502050505030304" pitchFamily="18" charset="0"/>
+              </a:rPr>
+              <a:t> </a:t>
+            </a:r>
+            <a:r>
+              <a:rPr lang="it-IT" sz="2000" dirty="0" err="1">
+                <a:latin typeface="Palatino Linotype" panose="02040502050505030304" pitchFamily="18" charset="0"/>
+              </a:rPr>
+              <a:t>vector</a:t>
+            </a:r>
+            <a:r>
+              <a:rPr lang="it-IT" sz="2000" dirty="0">
+                <a:latin typeface="Palatino Linotype" panose="02040502050505030304" pitchFamily="18" charset="0"/>
+              </a:rPr>
+              <a:t> for the </a:t>
+            </a:r>
+            <a:r>
+              <a:rPr lang="it-IT" sz="2000" dirty="0" err="1">
+                <a:latin typeface="Palatino Linotype" panose="02040502050505030304" pitchFamily="18" charset="0"/>
+              </a:rPr>
+              <a:t>circle</a:t>
+            </a:r>
+            <a:r>
+              <a:rPr lang="it-IT" sz="2000" dirty="0">
+                <a:latin typeface="Palatino Linotype" panose="02040502050505030304" pitchFamily="18" charset="0"/>
+              </a:rPr>
+              <a:t> </a:t>
+            </a:r>
+            <a:r>
+              <a:rPr lang="it-IT" sz="2000" dirty="0" err="1">
+                <a:latin typeface="Palatino Linotype" panose="02040502050505030304" pitchFamily="18" charset="0"/>
+              </a:rPr>
+              <a:t>radius</a:t>
+            </a:r>
+            <a:r>
+              <a:rPr lang="it-IT" sz="2000" dirty="0">
+                <a:latin typeface="Palatino Linotype" panose="02040502050505030304" pitchFamily="18" charset="0"/>
+              </a:rPr>
+              <a:t> in SVG format</a:t>
+            </a:r>
+            <a:endParaRPr lang="en-GB" sz="2000" dirty="0">
+              <a:latin typeface="Palatino Linotype" panose="02040502050505030304" pitchFamily="18" charset="0"/>
+            </a:endParaRPr>
+          </a:p>
+        </p:txBody>
+      </p:sp>
+      <p:sp>
+        <p:nvSpPr>
+          <p:cNvPr id="8" name="Ovale 7"/>
           <p:cNvSpPr/>
           <p:nvPr/>
         </p:nvSpPr>
         <p:spPr>
           <a:xfrm>
-            <a:off x="9035497" y="2971801"/>
-            <a:ext cx="2225842" cy="2111542"/>
-          </a:xfrm>
-          <a:prstGeom prst="rect">
-            <a:avLst/>
-          </a:prstGeom>
-          <a:ln w="38100">
-            <a:solidFill>
-              <a:srgbClr val="00B050"/>
-            </a:solidFill>
-          </a:ln>
+            <a:off x="3989763" y="3434307"/>
+            <a:ext cx="1260000" cy="1260000"/>
+          </a:xfrm>
+          <a:prstGeom prst="ellipse">
+            <a:avLst/>
+          </a:prstGeom>
         </p:spPr>
         <p:style>
-          <a:lnRef idx="2">
-            <a:schemeClr val="accent6"/>
+          <a:lnRef idx="1">
+            <a:schemeClr val="accent4"/>
           </a:lnRef>
-          <a:fillRef idx="1">
-            <a:schemeClr val="lt1"/>
+          <a:fillRef idx="2">
+            <a:schemeClr val="accent4"/>
           </a:fillRef>
-          <a:effectRef idx="0">
-            <a:schemeClr val="accent6"/>
+          <a:effectRef idx="1">
+            <a:schemeClr val="accent4"/>
           </a:effectRef>
           <a:fontRef idx="minor">
             <a:schemeClr val="dk1"/>
           </a:fontRef>
         </p:style>
         <p:txBody>
-          <a:bodyPr rtlCol="0" anchor="t"/>
+          <a:bodyPr rtlCol="0" anchor="ctr"/>
           <a:lstStyle/>
           <a:p>
             <a:pPr algn="ctr"/>
+            <a:endParaRPr lang="en-GB"/>
+          </a:p>
+        </p:txBody>
+      </p:sp>
+      <p:sp>
+        <p:nvSpPr>
+          <p:cNvPr id="9" name="CasellaDiTesto 8"/>
+          <p:cNvSpPr txBox="1"/>
+          <p:nvPr/>
+        </p:nvSpPr>
+        <p:spPr>
+          <a:xfrm>
+            <a:off x="3377684" y="2524154"/>
+            <a:ext cx="2358190" cy="830997"/>
+          </a:xfrm>
+          <a:prstGeom prst="rect">
+            <a:avLst/>
+          </a:prstGeom>
+          <a:noFill/>
+        </p:spPr>
+        <p:txBody>
+          <a:bodyPr wrap="square" rtlCol="0">
+            <a:spAutoFit/>
+          </a:bodyPr>
+          <a:lstStyle/>
+          <a:p>
+            <a:pPr algn="ctr"/>
+            <a:r>
+              <a:rPr lang="it-IT" sz="2400" b="1" dirty="0" err="1">
+                <a:latin typeface="Palatino Linotype" panose="02040502050505030304" pitchFamily="18" charset="0"/>
+              </a:rPr>
+              <a:t>Entity</a:t>
+            </a:r>
             <a:r>
               <a:rPr lang="it-IT" sz="2400" dirty="0">
                 <a:latin typeface="Palatino Linotype" panose="02040502050505030304" pitchFamily="18" charset="0"/>
               </a:rPr>
-              <a:t>Server</a:t>
-            </a:r>
+              <a:t>: a </a:t>
+            </a:r>
+            <a:r>
+              <a:rPr lang="it-IT" sz="2400" dirty="0" err="1">
+                <a:latin typeface="Palatino Linotype" panose="02040502050505030304" pitchFamily="18" charset="0"/>
+              </a:rPr>
+              <a:t>circle</a:t>
+            </a:r>
+            <a:r>
+              <a:rPr lang="it-IT" sz="2400" dirty="0">
+                <a:latin typeface="Palatino Linotype" panose="02040502050505030304" pitchFamily="18" charset="0"/>
+              </a:rPr>
+              <a:t> </a:t>
+            </a:r>
+            <a:r>
+              <a:rPr lang="it-IT" sz="2400" dirty="0" err="1">
+                <a:latin typeface="Palatino Linotype" panose="02040502050505030304" pitchFamily="18" charset="0"/>
+              </a:rPr>
+              <a:t>realization</a:t>
+            </a:r>
+            <a:endParaRPr lang="en-GB" sz="2400" dirty="0">
+              <a:latin typeface="Palatino Linotype" panose="02040502050505030304" pitchFamily="18" charset="0"/>
+            </a:endParaRPr>
+          </a:p>
+        </p:txBody>
+      </p:sp>
+      <p:sp>
+        <p:nvSpPr>
+          <p:cNvPr id="10" name="Ovale 9"/>
+          <p:cNvSpPr/>
+          <p:nvPr/>
+        </p:nvSpPr>
+        <p:spPr>
+          <a:xfrm>
+            <a:off x="8547038" y="2510291"/>
+            <a:ext cx="1260000" cy="1260000"/>
+          </a:xfrm>
+          <a:prstGeom prst="ellipse">
+            <a:avLst/>
+          </a:prstGeom>
+        </p:spPr>
+        <p:style>
+          <a:lnRef idx="1">
+            <a:schemeClr val="accent4"/>
+          </a:lnRef>
+          <a:fillRef idx="2">
+            <a:schemeClr val="accent4"/>
+          </a:fillRef>
+          <a:effectRef idx="1">
+            <a:schemeClr val="accent4"/>
+          </a:effectRef>
+          <a:fontRef idx="minor">
+            <a:schemeClr val="dk1"/>
+          </a:fontRef>
+        </p:style>
+        <p:txBody>
+          <a:bodyPr rtlCol="0" anchor="ctr"/>
+          <a:lstStyle/>
+          <a:p>
+            <a:pPr algn="ctr"/>
+            <a:endParaRPr lang="en-GB"/>
+          </a:p>
+        </p:txBody>
+      </p:sp>
+      <p:sp>
+        <p:nvSpPr>
+          <p:cNvPr id="11" name="Ovale 10"/>
+          <p:cNvSpPr/>
+          <p:nvPr/>
+        </p:nvSpPr>
+        <p:spPr>
+          <a:xfrm>
+            <a:off x="8504927" y="4979805"/>
+            <a:ext cx="1260000" cy="1260000"/>
+          </a:xfrm>
+          <a:prstGeom prst="ellipse">
+            <a:avLst/>
+          </a:prstGeom>
+        </p:spPr>
+        <p:style>
+          <a:lnRef idx="1">
+            <a:schemeClr val="accent4"/>
+          </a:lnRef>
+          <a:fillRef idx="2">
+            <a:schemeClr val="accent4"/>
+          </a:fillRef>
+          <a:effectRef idx="1">
+            <a:schemeClr val="accent4"/>
+          </a:effectRef>
+          <a:fontRef idx="minor">
+            <a:schemeClr val="dk1"/>
+          </a:fontRef>
+        </p:style>
+        <p:txBody>
+          <a:bodyPr rtlCol="0" anchor="ctr"/>
+          <a:lstStyle/>
+          <a:p>
+            <a:pPr algn="ctr"/>
+            <a:endParaRPr lang="en-GB"/>
+          </a:p>
+        </p:txBody>
+      </p:sp>
+      <p:sp>
+        <p:nvSpPr>
+          <p:cNvPr id="12" name="Ovale 11"/>
+          <p:cNvSpPr/>
+          <p:nvPr/>
+        </p:nvSpPr>
+        <p:spPr>
+          <a:xfrm>
+            <a:off x="9141038" y="3104291"/>
+            <a:ext cx="72000" cy="72000"/>
+          </a:xfrm>
+          <a:prstGeom prst="ellipse">
+            <a:avLst/>
+          </a:prstGeom>
+          <a:solidFill>
+            <a:srgbClr val="C00000"/>
+          </a:solidFill>
+          <a:ln>
+            <a:solidFill>
+              <a:srgbClr val="C00000"/>
+            </a:solidFill>
+          </a:ln>
+        </p:spPr>
+        <p:style>
+          <a:lnRef idx="2">
+            <a:schemeClr val="accent1">
+              <a:shade val="50000"/>
+            </a:schemeClr>
+          </a:lnRef>
+          <a:fillRef idx="1">
+            <a:schemeClr val="accent1"/>
+          </a:fillRef>
+          <a:effectRef idx="0">
+            <a:schemeClr val="accent1"/>
+          </a:effectRef>
+          <a:fontRef idx="minor">
+            <a:schemeClr val="lt1"/>
+          </a:fontRef>
+        </p:style>
+        <p:txBody>
+          <a:bodyPr rtlCol="0" anchor="ctr"/>
+          <a:lstStyle/>
+          <a:p>
+            <a:pPr algn="ctr"/>
+            <a:endParaRPr lang="en-GB"/>
           </a:p>
         </p:txBody>
       </p:sp>
       <p:cxnSp>
         <p:nvCxnSpPr>
-          <p:cNvPr id="6" name="Connettore 2 5"/>
+          <p:cNvPr id="14" name="Connettore diritto 13"/>
+          <p:cNvCxnSpPr>
+            <a:stCxn id="12" idx="7"/>
+            <a:endCxn id="10" idx="7"/>
+          </p:cNvCxnSpPr>
+          <p:nvPr/>
+        </p:nvCxnSpPr>
+        <p:spPr>
+          <a:xfrm flipV="1">
+            <a:off x="9202494" y="2694814"/>
+            <a:ext cx="420021" cy="420021"/>
+          </a:xfrm>
+          <a:prstGeom prst="line">
+            <a:avLst/>
+          </a:prstGeom>
+          <a:ln w="19050">
+            <a:solidFill>
+              <a:srgbClr val="C00000"/>
+            </a:solidFill>
+            <a:prstDash val="dash"/>
+          </a:ln>
+        </p:spPr>
+        <p:style>
+          <a:lnRef idx="1">
+            <a:schemeClr val="accent1"/>
+          </a:lnRef>
+          <a:fillRef idx="0">
+            <a:schemeClr val="accent1"/>
+          </a:fillRef>
+          <a:effectRef idx="0">
+            <a:schemeClr val="accent1"/>
+          </a:effectRef>
+          <a:fontRef idx="minor">
+            <a:schemeClr val="tx1"/>
+          </a:fontRef>
+        </p:style>
+      </p:cxnSp>
+      <p:sp>
+        <p:nvSpPr>
+          <p:cNvPr id="15" name="Ovale 14"/>
+          <p:cNvSpPr/>
+          <p:nvPr/>
+        </p:nvSpPr>
+        <p:spPr>
+          <a:xfrm>
+            <a:off x="8679827" y="5128637"/>
+            <a:ext cx="72000" cy="72000"/>
+          </a:xfrm>
+          <a:prstGeom prst="ellipse">
+            <a:avLst/>
+          </a:prstGeom>
+          <a:solidFill>
+            <a:srgbClr val="C00000"/>
+          </a:solidFill>
+          <a:ln>
+            <a:solidFill>
+              <a:srgbClr val="C00000"/>
+            </a:solidFill>
+          </a:ln>
+        </p:spPr>
+        <p:style>
+          <a:lnRef idx="2">
+            <a:schemeClr val="accent1">
+              <a:shade val="50000"/>
+            </a:schemeClr>
+          </a:lnRef>
+          <a:fillRef idx="1">
+            <a:schemeClr val="accent1"/>
+          </a:fillRef>
+          <a:effectRef idx="0">
+            <a:schemeClr val="accent1"/>
+          </a:effectRef>
+          <a:fontRef idx="minor">
+            <a:schemeClr val="lt1"/>
+          </a:fontRef>
+        </p:style>
+        <p:txBody>
+          <a:bodyPr rtlCol="0" anchor="ctr"/>
+          <a:lstStyle/>
+          <a:p>
+            <a:pPr algn="ctr"/>
+            <a:endParaRPr lang="en-GB"/>
+          </a:p>
+        </p:txBody>
+      </p:sp>
+      <p:sp>
+        <p:nvSpPr>
+          <p:cNvPr id="16" name="Ovale 15"/>
+          <p:cNvSpPr/>
+          <p:nvPr/>
+        </p:nvSpPr>
+        <p:spPr>
+          <a:xfrm>
+            <a:off x="8848269" y="6149757"/>
+            <a:ext cx="72000" cy="72000"/>
+          </a:xfrm>
+          <a:prstGeom prst="ellipse">
+            <a:avLst/>
+          </a:prstGeom>
+          <a:solidFill>
+            <a:srgbClr val="C00000"/>
+          </a:solidFill>
+          <a:ln>
+            <a:solidFill>
+              <a:srgbClr val="C00000"/>
+            </a:solidFill>
+          </a:ln>
+        </p:spPr>
+        <p:style>
+          <a:lnRef idx="2">
+            <a:schemeClr val="accent1">
+              <a:shade val="50000"/>
+            </a:schemeClr>
+          </a:lnRef>
+          <a:fillRef idx="1">
+            <a:schemeClr val="accent1"/>
+          </a:fillRef>
+          <a:effectRef idx="0">
+            <a:schemeClr val="accent1"/>
+          </a:effectRef>
+          <a:fontRef idx="minor">
+            <a:schemeClr val="lt1"/>
+          </a:fontRef>
+        </p:style>
+        <p:txBody>
+          <a:bodyPr rtlCol="0" anchor="ctr"/>
+          <a:lstStyle/>
+          <a:p>
+            <a:pPr algn="ctr"/>
+            <a:endParaRPr lang="en-GB"/>
+          </a:p>
+        </p:txBody>
+      </p:sp>
+      <p:sp>
+        <p:nvSpPr>
+          <p:cNvPr id="17" name="Ovale 16"/>
+          <p:cNvSpPr/>
+          <p:nvPr/>
+        </p:nvSpPr>
+        <p:spPr>
+          <a:xfrm>
+            <a:off x="9588210" y="5182786"/>
+            <a:ext cx="72000" cy="72000"/>
+          </a:xfrm>
+          <a:prstGeom prst="ellipse">
+            <a:avLst/>
+          </a:prstGeom>
+          <a:solidFill>
+            <a:srgbClr val="C00000"/>
+          </a:solidFill>
+          <a:ln>
+            <a:solidFill>
+              <a:srgbClr val="C00000"/>
+            </a:solidFill>
+          </a:ln>
+        </p:spPr>
+        <p:style>
+          <a:lnRef idx="2">
+            <a:schemeClr val="accent1">
+              <a:shade val="50000"/>
+            </a:schemeClr>
+          </a:lnRef>
+          <a:fillRef idx="1">
+            <a:schemeClr val="accent1"/>
+          </a:fillRef>
+          <a:effectRef idx="0">
+            <a:schemeClr val="accent1"/>
+          </a:effectRef>
+          <a:fontRef idx="minor">
+            <a:schemeClr val="lt1"/>
+          </a:fontRef>
+        </p:style>
+        <p:txBody>
+          <a:bodyPr rtlCol="0" anchor="ctr"/>
+          <a:lstStyle/>
+          <a:p>
+            <a:pPr algn="ctr"/>
+            <a:endParaRPr lang="en-GB"/>
+          </a:p>
+        </p:txBody>
+      </p:sp>
+      <p:sp>
+        <p:nvSpPr>
+          <p:cNvPr id="18" name="CasellaDiTesto 17"/>
+          <p:cNvSpPr txBox="1"/>
+          <p:nvPr/>
+        </p:nvSpPr>
+        <p:spPr>
+          <a:xfrm>
+            <a:off x="6701589" y="4168113"/>
+            <a:ext cx="5017169" cy="707886"/>
+          </a:xfrm>
+          <a:prstGeom prst="rect">
+            <a:avLst/>
+          </a:prstGeom>
+          <a:noFill/>
+        </p:spPr>
+        <p:txBody>
+          <a:bodyPr wrap="square" rtlCol="0">
+            <a:spAutoFit/>
+          </a:bodyPr>
+          <a:lstStyle/>
+          <a:p>
+            <a:pPr algn="ctr"/>
+            <a:r>
+              <a:rPr lang="it-IT" sz="2000" b="1" dirty="0" err="1">
+                <a:latin typeface="Palatino Linotype" panose="02040502050505030304" pitchFamily="18" charset="0"/>
+              </a:rPr>
+              <a:t>Representation</a:t>
+            </a:r>
+            <a:r>
+              <a:rPr lang="it-IT" sz="2000" b="1" dirty="0">
+                <a:latin typeface="Palatino Linotype" panose="02040502050505030304" pitchFamily="18" charset="0"/>
+              </a:rPr>
+              <a:t> 2</a:t>
+            </a:r>
+            <a:r>
+              <a:rPr lang="it-IT" sz="2000" dirty="0">
+                <a:latin typeface="Palatino Linotype" panose="02040502050505030304" pitchFamily="18" charset="0"/>
+              </a:rPr>
+              <a:t>: </a:t>
+            </a:r>
+            <a:r>
+              <a:rPr lang="it-IT" sz="2000" dirty="0" err="1">
+                <a:latin typeface="Palatino Linotype" panose="02040502050505030304" pitchFamily="18" charset="0"/>
+              </a:rPr>
+              <a:t>coordinates</a:t>
+            </a:r>
+            <a:r>
+              <a:rPr lang="it-IT" sz="2000" dirty="0">
+                <a:latin typeface="Palatino Linotype" panose="02040502050505030304" pitchFamily="18" charset="0"/>
+              </a:rPr>
+              <a:t> of </a:t>
+            </a:r>
+            <a:r>
+              <a:rPr lang="it-IT" sz="2000" dirty="0" err="1">
+                <a:latin typeface="Palatino Linotype" panose="02040502050505030304" pitchFamily="18" charset="0"/>
+              </a:rPr>
+              <a:t>three</a:t>
+            </a:r>
+            <a:r>
+              <a:rPr lang="it-IT" sz="2000" dirty="0">
+                <a:latin typeface="Palatino Linotype" panose="02040502050505030304" pitchFamily="18" charset="0"/>
+              </a:rPr>
+              <a:t> </a:t>
+            </a:r>
+            <a:r>
+              <a:rPr lang="it-IT" sz="2000" dirty="0" err="1">
+                <a:latin typeface="Palatino Linotype" panose="02040502050505030304" pitchFamily="18" charset="0"/>
+              </a:rPr>
+              <a:t>points</a:t>
+            </a:r>
+            <a:r>
+              <a:rPr lang="it-IT" sz="2000" dirty="0">
+                <a:latin typeface="Palatino Linotype" panose="02040502050505030304" pitchFamily="18" charset="0"/>
+              </a:rPr>
+              <a:t> of the </a:t>
+            </a:r>
+            <a:r>
+              <a:rPr lang="it-IT" sz="2000" dirty="0" err="1">
+                <a:latin typeface="Palatino Linotype" panose="02040502050505030304" pitchFamily="18" charset="0"/>
+              </a:rPr>
+              <a:t>circumference</a:t>
+            </a:r>
+            <a:r>
+              <a:rPr lang="it-IT" sz="2000" dirty="0">
+                <a:latin typeface="Palatino Linotype" panose="02040502050505030304" pitchFamily="18" charset="0"/>
+              </a:rPr>
+              <a:t> in a </a:t>
+            </a:r>
+            <a:r>
+              <a:rPr lang="it-IT" sz="2000" dirty="0" err="1">
+                <a:latin typeface="Palatino Linotype" panose="02040502050505030304" pitchFamily="18" charset="0"/>
+              </a:rPr>
+              <a:t>csv</a:t>
+            </a:r>
+            <a:r>
+              <a:rPr lang="it-IT" sz="2000" dirty="0">
+                <a:latin typeface="Palatino Linotype" panose="02040502050505030304" pitchFamily="18" charset="0"/>
+              </a:rPr>
+              <a:t> file</a:t>
+            </a:r>
+            <a:endParaRPr lang="en-GB" sz="2000" dirty="0">
+              <a:latin typeface="Palatino Linotype" panose="02040502050505030304" pitchFamily="18" charset="0"/>
+            </a:endParaRPr>
+          </a:p>
+        </p:txBody>
+      </p:sp>
+      <p:cxnSp>
+        <p:nvCxnSpPr>
+          <p:cNvPr id="20" name="Connettore 2 19"/>
           <p:cNvCxnSpPr/>
           <p:nvPr/>
         </p:nvCxnSpPr>
         <p:spPr>
-          <a:xfrm>
-            <a:off x="3441031" y="3595773"/>
-            <a:ext cx="4866774" cy="0"/>
+          <a:xfrm flipV="1">
+            <a:off x="5648826" y="2316080"/>
+            <a:ext cx="1052763" cy="848227"/>
           </a:xfrm>
           <a:prstGeom prst="straightConnector1">
             <a:avLst/>
           </a:prstGeom>
-          <a:ln w="28575">
+          <a:ln w="57150">
             <a:solidFill>
               <a:schemeClr val="tx1"/>
             </a:solidFill>
@@ -7690,19 +7531,19 @@
       </p:cxnSp>
       <p:cxnSp>
         <p:nvCxnSpPr>
-          <p:cNvPr id="8" name="Connettore 2 7"/>
+          <p:cNvPr id="21" name="Connettore 2 20"/>
           <p:cNvCxnSpPr/>
           <p:nvPr/>
         </p:nvCxnSpPr>
         <p:spPr>
-          <a:xfrm flipH="1">
-            <a:off x="3441031" y="4351945"/>
-            <a:ext cx="4788000" cy="0"/>
+          <a:xfrm>
+            <a:off x="5648826" y="4168114"/>
+            <a:ext cx="1221206" cy="353942"/>
           </a:xfrm>
           <a:prstGeom prst="straightConnector1">
             <a:avLst/>
           </a:prstGeom>
-          <a:ln w="28575">
+          <a:ln w="57150">
             <a:solidFill>
               <a:schemeClr val="tx1"/>
             </a:solidFill>
@@ -7726,878 +7567,6 @@
       </p:cxnSp>
       <p:sp>
         <p:nvSpPr>
-          <p:cNvPr id="9" name="Ovale 8"/>
-          <p:cNvSpPr/>
-          <p:nvPr/>
-        </p:nvSpPr>
-        <p:spPr>
-          <a:xfrm>
-            <a:off x="9539821" y="3588897"/>
-            <a:ext cx="1217194" cy="877348"/>
-          </a:xfrm>
-          <a:prstGeom prst="ellipse">
-            <a:avLst/>
-          </a:prstGeom>
-          <a:solidFill>
-            <a:srgbClr val="00B050"/>
-          </a:solidFill>
-          <a:ln>
-            <a:solidFill>
-              <a:schemeClr val="tx1"/>
-            </a:solidFill>
-          </a:ln>
-        </p:spPr>
-        <p:style>
-          <a:lnRef idx="2">
-            <a:schemeClr val="accent1">
-              <a:shade val="50000"/>
-            </a:schemeClr>
-          </a:lnRef>
-          <a:fillRef idx="1">
-            <a:schemeClr val="accent1"/>
-          </a:fillRef>
-          <a:effectRef idx="0">
-            <a:schemeClr val="accent1"/>
-          </a:effectRef>
-          <a:fontRef idx="minor">
-            <a:schemeClr val="lt1"/>
-          </a:fontRef>
-        </p:style>
-        <p:txBody>
-          <a:bodyPr rtlCol="0" anchor="ctr"/>
-          <a:lstStyle/>
-          <a:p>
-            <a:pPr algn="ctr"/>
-            <a:r>
-              <a:rPr lang="it-IT" dirty="0" err="1">
-                <a:latin typeface="Palatino Linotype" panose="02040502050505030304" pitchFamily="18" charset="0"/>
-              </a:rPr>
-              <a:t>Entity</a:t>
-            </a:r>
-            <a:endParaRPr lang="en-GB" dirty="0">
-              <a:latin typeface="Palatino Linotype" panose="02040502050505030304" pitchFamily="18" charset="0"/>
-            </a:endParaRPr>
-          </a:p>
-          <a:p>
-            <a:pPr algn="ctr"/>
-            <a:endParaRPr lang="it-IT" dirty="0">
-              <a:latin typeface="Palatino Linotype" panose="02040502050505030304" pitchFamily="18" charset="0"/>
-            </a:endParaRPr>
-          </a:p>
-        </p:txBody>
-      </p:sp>
-      <p:sp>
-        <p:nvSpPr>
-          <p:cNvPr id="10" name="Rettangolo 9"/>
-          <p:cNvSpPr/>
-          <p:nvPr/>
-        </p:nvSpPr>
-        <p:spPr>
-          <a:xfrm>
-            <a:off x="8897421" y="3341133"/>
-            <a:ext cx="264695" cy="1330128"/>
-          </a:xfrm>
-          <a:prstGeom prst="rect">
-            <a:avLst/>
-          </a:prstGeom>
-        </p:spPr>
-        <p:style>
-          <a:lnRef idx="2">
-            <a:schemeClr val="dk1">
-              <a:shade val="50000"/>
-            </a:schemeClr>
-          </a:lnRef>
-          <a:fillRef idx="1">
-            <a:schemeClr val="dk1"/>
-          </a:fillRef>
-          <a:effectRef idx="0">
-            <a:schemeClr val="dk1"/>
-          </a:effectRef>
-          <a:fontRef idx="minor">
-            <a:schemeClr val="lt1"/>
-          </a:fontRef>
-        </p:style>
-        <p:txBody>
-          <a:bodyPr rtlCol="0" anchor="ctr"/>
-          <a:lstStyle/>
-          <a:p>
-            <a:pPr algn="ctr"/>
-            <a:endParaRPr lang="en-GB"/>
-          </a:p>
-        </p:txBody>
-      </p:sp>
-      <p:sp>
-        <p:nvSpPr>
-          <p:cNvPr id="11" name="Rettangolo 10"/>
-          <p:cNvSpPr/>
-          <p:nvPr/>
-        </p:nvSpPr>
-        <p:spPr>
-          <a:xfrm>
-            <a:off x="2566953" y="3437433"/>
-            <a:ext cx="264695" cy="986043"/>
-          </a:xfrm>
-          <a:prstGeom prst="rect">
-            <a:avLst/>
-          </a:prstGeom>
-        </p:spPr>
-        <p:style>
-          <a:lnRef idx="2">
-            <a:schemeClr val="dk1">
-              <a:shade val="50000"/>
-            </a:schemeClr>
-          </a:lnRef>
-          <a:fillRef idx="1">
-            <a:schemeClr val="dk1"/>
-          </a:fillRef>
-          <a:effectRef idx="0">
-            <a:schemeClr val="dk1"/>
-          </a:effectRef>
-          <a:fontRef idx="minor">
-            <a:schemeClr val="lt1"/>
-          </a:fontRef>
-        </p:style>
-        <p:txBody>
-          <a:bodyPr rtlCol="0" anchor="ctr"/>
-          <a:lstStyle/>
-          <a:p>
-            <a:pPr algn="ctr"/>
-            <a:endParaRPr lang="en-GB"/>
-          </a:p>
-        </p:txBody>
-      </p:sp>
-      <p:cxnSp>
-        <p:nvCxnSpPr>
-          <p:cNvPr id="12" name="Connettore 2 11"/>
-          <p:cNvCxnSpPr/>
-          <p:nvPr/>
-        </p:nvCxnSpPr>
-        <p:spPr>
-          <a:xfrm>
-            <a:off x="9211391" y="3477127"/>
-            <a:ext cx="475247" cy="186489"/>
-          </a:xfrm>
-          <a:prstGeom prst="straightConnector1">
-            <a:avLst/>
-          </a:prstGeom>
-          <a:ln w="28575">
-            <a:solidFill>
-              <a:schemeClr val="tx1"/>
-            </a:solidFill>
-            <a:prstDash val="sysDash"/>
-            <a:tailEnd type="triangle"/>
-          </a:ln>
-        </p:spPr>
-        <p:style>
-          <a:lnRef idx="1">
-            <a:schemeClr val="accent1"/>
-          </a:lnRef>
-          <a:fillRef idx="0">
-            <a:schemeClr val="accent1"/>
-          </a:fillRef>
-          <a:effectRef idx="0">
-            <a:schemeClr val="accent1"/>
-          </a:effectRef>
-          <a:fontRef idx="minor">
-            <a:schemeClr val="tx1"/>
-          </a:fontRef>
-        </p:style>
-      </p:cxnSp>
-      <p:cxnSp>
-        <p:nvCxnSpPr>
-          <p:cNvPr id="13" name="Connettore 2 12"/>
-          <p:cNvCxnSpPr/>
-          <p:nvPr/>
-        </p:nvCxnSpPr>
-        <p:spPr>
-          <a:xfrm flipH="1">
-            <a:off x="9211391" y="4325353"/>
-            <a:ext cx="423679" cy="232001"/>
-          </a:xfrm>
-          <a:prstGeom prst="straightConnector1">
-            <a:avLst/>
-          </a:prstGeom>
-          <a:ln w="28575">
-            <a:solidFill>
-              <a:schemeClr val="tx1"/>
-            </a:solidFill>
-            <a:prstDash val="sysDash"/>
-            <a:tailEnd type="triangle"/>
-          </a:ln>
-        </p:spPr>
-        <p:style>
-          <a:lnRef idx="1">
-            <a:schemeClr val="accent1"/>
-          </a:lnRef>
-          <a:fillRef idx="0">
-            <a:schemeClr val="accent1"/>
-          </a:fillRef>
-          <a:effectRef idx="0">
-            <a:schemeClr val="accent1"/>
-          </a:effectRef>
-          <a:fontRef idx="minor">
-            <a:schemeClr val="tx1"/>
-          </a:fontRef>
-        </p:style>
-      </p:cxnSp>
-      <p:sp>
-        <p:nvSpPr>
-          <p:cNvPr id="14" name="CasellaDiTesto 13"/>
-          <p:cNvSpPr txBox="1"/>
-          <p:nvPr/>
-        </p:nvSpPr>
-        <p:spPr>
-          <a:xfrm>
-            <a:off x="9531372" y="3975893"/>
-            <a:ext cx="1553076" cy="307777"/>
-          </a:xfrm>
-          <a:prstGeom prst="rect">
-            <a:avLst/>
-          </a:prstGeom>
-          <a:noFill/>
-        </p:spPr>
-        <p:txBody>
-          <a:bodyPr wrap="square" rtlCol="0">
-            <a:spAutoFit/>
-          </a:bodyPr>
-          <a:lstStyle/>
-          <a:p>
-            <a:r>
-              <a:rPr lang="it-IT" sz="1400" dirty="0">
-                <a:solidFill>
-                  <a:schemeClr val="bg1"/>
-                </a:solidFill>
-                <a:latin typeface="Palatino Linotype" panose="02040502050505030304" pitchFamily="18" charset="0"/>
-              </a:rPr>
-              <a:t>(</a:t>
-            </a:r>
-            <a:r>
-              <a:rPr lang="it-IT" sz="1400" dirty="0" err="1">
-                <a:solidFill>
-                  <a:schemeClr val="bg1"/>
-                </a:solidFill>
-                <a:latin typeface="Palatino Linotype" panose="02040502050505030304" pitchFamily="18" charset="0"/>
-              </a:rPr>
-              <a:t>raw</a:t>
-            </a:r>
-            <a:r>
-              <a:rPr lang="it-IT" sz="1400" dirty="0">
-                <a:solidFill>
-                  <a:schemeClr val="bg1"/>
-                </a:solidFill>
-                <a:latin typeface="Palatino Linotype" panose="02040502050505030304" pitchFamily="18" charset="0"/>
-              </a:rPr>
-              <a:t> format)</a:t>
-            </a:r>
-            <a:endParaRPr lang="en-GB" sz="1400" dirty="0">
-              <a:solidFill>
-                <a:schemeClr val="bg1"/>
-              </a:solidFill>
-              <a:latin typeface="Palatino Linotype" panose="02040502050505030304" pitchFamily="18" charset="0"/>
-            </a:endParaRPr>
-          </a:p>
-        </p:txBody>
-      </p:sp>
-      <p:sp>
-        <p:nvSpPr>
-          <p:cNvPr id="17" name="Rettangolo arrotondato 16"/>
-          <p:cNvSpPr/>
-          <p:nvPr/>
-        </p:nvSpPr>
-        <p:spPr>
-          <a:xfrm>
-            <a:off x="3774689" y="4557354"/>
-            <a:ext cx="4138863" cy="2100055"/>
-          </a:xfrm>
-          <a:prstGeom prst="roundRect">
-            <a:avLst/>
-          </a:prstGeom>
-          <a:solidFill>
-            <a:schemeClr val="bg1"/>
-          </a:solidFill>
-          <a:ln w="19050">
-            <a:solidFill>
-              <a:schemeClr val="tx1"/>
-            </a:solidFill>
-          </a:ln>
-        </p:spPr>
-        <p:style>
-          <a:lnRef idx="2">
-            <a:schemeClr val="accent1">
-              <a:shade val="50000"/>
-            </a:schemeClr>
-          </a:lnRef>
-          <a:fillRef idx="1">
-            <a:schemeClr val="accent1"/>
-          </a:fillRef>
-          <a:effectRef idx="0">
-            <a:schemeClr val="accent1"/>
-          </a:effectRef>
-          <a:fontRef idx="minor">
-            <a:schemeClr val="lt1"/>
-          </a:fontRef>
-        </p:style>
-        <p:txBody>
-          <a:bodyPr rtlCol="0" anchor="t"/>
-          <a:lstStyle/>
-          <a:p>
-            <a:pPr algn="ctr"/>
-            <a:r>
-              <a:rPr lang="it-IT" b="1" dirty="0">
-                <a:solidFill>
-                  <a:schemeClr val="tx1"/>
-                </a:solidFill>
-                <a:latin typeface="Palatino Linotype" panose="02040502050505030304" pitchFamily="18" charset="0"/>
-              </a:rPr>
-              <a:t>REST </a:t>
-            </a:r>
-            <a:r>
-              <a:rPr lang="it-IT" b="1" dirty="0" err="1">
-                <a:solidFill>
-                  <a:schemeClr val="tx1"/>
-                </a:solidFill>
-                <a:latin typeface="Palatino Linotype" panose="02040502050505030304" pitchFamily="18" charset="0"/>
-              </a:rPr>
-              <a:t>response</a:t>
-            </a:r>
-            <a:r>
-              <a:rPr lang="it-IT" b="1" dirty="0">
-                <a:solidFill>
-                  <a:schemeClr val="tx1"/>
-                </a:solidFill>
-                <a:latin typeface="Palatino Linotype" panose="02040502050505030304" pitchFamily="18" charset="0"/>
-              </a:rPr>
-              <a:t> </a:t>
-            </a:r>
-            <a:r>
-              <a:rPr lang="it-IT" b="1" dirty="0" err="1">
-                <a:solidFill>
-                  <a:schemeClr val="tx1"/>
-                </a:solidFill>
-                <a:latin typeface="Palatino Linotype" panose="02040502050505030304" pitchFamily="18" charset="0"/>
-              </a:rPr>
-              <a:t>message</a:t>
-            </a:r>
-            <a:endParaRPr lang="en-GB" b="1" dirty="0">
-              <a:solidFill>
-                <a:schemeClr val="tx1"/>
-              </a:solidFill>
-              <a:latin typeface="Palatino Linotype" panose="02040502050505030304" pitchFamily="18" charset="0"/>
-            </a:endParaRPr>
-          </a:p>
-        </p:txBody>
-      </p:sp>
-      <p:sp>
-        <p:nvSpPr>
-          <p:cNvPr id="18" name="Rettangolo arrotondato 17"/>
-          <p:cNvSpPr/>
-          <p:nvPr/>
-        </p:nvSpPr>
-        <p:spPr>
-          <a:xfrm>
-            <a:off x="3949365" y="5691188"/>
-            <a:ext cx="1852863" cy="843206"/>
-          </a:xfrm>
-          <a:prstGeom prst="roundRect">
-            <a:avLst/>
-          </a:prstGeom>
-          <a:solidFill>
-            <a:schemeClr val="accent6">
-              <a:lumMod val="20000"/>
-              <a:lumOff val="80000"/>
-            </a:schemeClr>
-          </a:solidFill>
-        </p:spPr>
-        <p:style>
-          <a:lnRef idx="2">
-            <a:schemeClr val="dk1"/>
-          </a:lnRef>
-          <a:fillRef idx="1">
-            <a:schemeClr val="lt1"/>
-          </a:fillRef>
-          <a:effectRef idx="0">
-            <a:schemeClr val="dk1"/>
-          </a:effectRef>
-          <a:fontRef idx="minor">
-            <a:schemeClr val="dk1"/>
-          </a:fontRef>
-        </p:style>
-        <p:txBody>
-          <a:bodyPr rtlCol="0" anchor="ctr"/>
-          <a:lstStyle/>
-          <a:p>
-            <a:pPr algn="ctr"/>
-            <a:r>
-              <a:rPr lang="it-IT" sz="1600" dirty="0" err="1">
-                <a:latin typeface="Palatino Linotype" panose="02040502050505030304" pitchFamily="18" charset="0"/>
-              </a:rPr>
-              <a:t>Representation</a:t>
-            </a:r>
-            <a:endParaRPr lang="it-IT" sz="1600" dirty="0">
-              <a:latin typeface="Palatino Linotype" panose="02040502050505030304" pitchFamily="18" charset="0"/>
-            </a:endParaRPr>
-          </a:p>
-          <a:p>
-            <a:pPr algn="ctr"/>
-            <a:r>
-              <a:rPr lang="it-IT" sz="1600" dirty="0">
-                <a:latin typeface="Palatino Linotype" panose="02040502050505030304" pitchFamily="18" charset="0"/>
-              </a:rPr>
-              <a:t>(optional)</a:t>
-            </a:r>
-            <a:endParaRPr lang="en-GB" sz="1600" dirty="0">
-              <a:latin typeface="Palatino Linotype" panose="02040502050505030304" pitchFamily="18" charset="0"/>
-            </a:endParaRPr>
-          </a:p>
-        </p:txBody>
-      </p:sp>
-      <p:sp>
-        <p:nvSpPr>
-          <p:cNvPr id="19" name="Rettangolo arrotondato 18"/>
-          <p:cNvSpPr/>
-          <p:nvPr/>
-        </p:nvSpPr>
-        <p:spPr>
-          <a:xfrm>
-            <a:off x="5913521" y="5691187"/>
-            <a:ext cx="1852863" cy="843207"/>
-          </a:xfrm>
-          <a:prstGeom prst="roundRect">
-            <a:avLst/>
-          </a:prstGeom>
-          <a:solidFill>
-            <a:schemeClr val="accent6">
-              <a:lumMod val="20000"/>
-              <a:lumOff val="80000"/>
-            </a:schemeClr>
-          </a:solidFill>
-        </p:spPr>
-        <p:style>
-          <a:lnRef idx="2">
-            <a:schemeClr val="dk1"/>
-          </a:lnRef>
-          <a:fillRef idx="1">
-            <a:schemeClr val="lt1"/>
-          </a:fillRef>
-          <a:effectRef idx="0">
-            <a:schemeClr val="dk1"/>
-          </a:effectRef>
-          <a:fontRef idx="minor">
-            <a:schemeClr val="dk1"/>
-          </a:fontRef>
-        </p:style>
-        <p:txBody>
-          <a:bodyPr rtlCol="0" anchor="ctr"/>
-          <a:lstStyle/>
-          <a:p>
-            <a:pPr algn="ctr"/>
-            <a:r>
-              <a:rPr lang="it-IT" sz="1600" dirty="0">
-                <a:latin typeface="Palatino Linotype" panose="02040502050505030304" pitchFamily="18" charset="0"/>
-              </a:rPr>
-              <a:t>Resource </a:t>
-            </a:r>
-            <a:r>
-              <a:rPr lang="it-IT" sz="1600" dirty="0" err="1">
-                <a:latin typeface="Palatino Linotype" panose="02040502050505030304" pitchFamily="18" charset="0"/>
-              </a:rPr>
-              <a:t>metadata</a:t>
-            </a:r>
-            <a:r>
-              <a:rPr lang="it-IT" sz="1600" dirty="0">
-                <a:latin typeface="Palatino Linotype" panose="02040502050505030304" pitchFamily="18" charset="0"/>
-              </a:rPr>
-              <a:t> (optional)</a:t>
-            </a:r>
-            <a:endParaRPr lang="en-GB" sz="1600" dirty="0">
-              <a:latin typeface="Palatino Linotype" panose="02040502050505030304" pitchFamily="18" charset="0"/>
-            </a:endParaRPr>
-          </a:p>
-        </p:txBody>
-      </p:sp>
-      <p:sp>
-        <p:nvSpPr>
-          <p:cNvPr id="20" name="Rettangolo arrotondato 19"/>
-          <p:cNvSpPr/>
-          <p:nvPr/>
-        </p:nvSpPr>
-        <p:spPr>
-          <a:xfrm>
-            <a:off x="5093366" y="5072180"/>
-            <a:ext cx="1574133" cy="558599"/>
-          </a:xfrm>
-          <a:prstGeom prst="roundRect">
-            <a:avLst/>
-          </a:prstGeom>
-          <a:solidFill>
-            <a:schemeClr val="accent6">
-              <a:lumMod val="20000"/>
-              <a:lumOff val="80000"/>
-            </a:schemeClr>
-          </a:solidFill>
-        </p:spPr>
-        <p:style>
-          <a:lnRef idx="2">
-            <a:schemeClr val="dk1"/>
-          </a:lnRef>
-          <a:fillRef idx="1">
-            <a:schemeClr val="lt1"/>
-          </a:fillRef>
-          <a:effectRef idx="0">
-            <a:schemeClr val="dk1"/>
-          </a:effectRef>
-          <a:fontRef idx="minor">
-            <a:schemeClr val="dk1"/>
-          </a:fontRef>
-        </p:style>
-        <p:txBody>
-          <a:bodyPr rtlCol="0" anchor="ctr"/>
-          <a:lstStyle/>
-          <a:p>
-            <a:pPr algn="ctr"/>
-            <a:r>
-              <a:rPr lang="it-IT" sz="1600" dirty="0">
-                <a:latin typeface="Palatino Linotype" panose="02040502050505030304" pitchFamily="18" charset="0"/>
-              </a:rPr>
-              <a:t>Control data</a:t>
-            </a:r>
-          </a:p>
-          <a:p>
-            <a:pPr algn="ctr"/>
-            <a:r>
-              <a:rPr lang="it-IT" sz="1600" dirty="0">
-                <a:latin typeface="Palatino Linotype" panose="02040502050505030304" pitchFamily="18" charset="0"/>
-              </a:rPr>
-              <a:t>(</a:t>
-            </a:r>
-            <a:r>
-              <a:rPr lang="it-IT" sz="1600" dirty="0" err="1">
-                <a:latin typeface="Palatino Linotype" panose="02040502050505030304" pitchFamily="18" charset="0"/>
-              </a:rPr>
-              <a:t>mandatory</a:t>
-            </a:r>
-            <a:r>
-              <a:rPr lang="it-IT" sz="1600" dirty="0">
-                <a:latin typeface="Palatino Linotype" panose="02040502050505030304" pitchFamily="18" charset="0"/>
-              </a:rPr>
-              <a:t>)</a:t>
-            </a:r>
-            <a:endParaRPr lang="en-GB" sz="1600" dirty="0">
-              <a:latin typeface="Palatino Linotype" panose="02040502050505030304" pitchFamily="18" charset="0"/>
-            </a:endParaRPr>
-          </a:p>
-        </p:txBody>
-      </p:sp>
-      <p:sp>
-        <p:nvSpPr>
-          <p:cNvPr id="21" name="Rettangolo arrotondato 20"/>
-          <p:cNvSpPr/>
-          <p:nvPr/>
-        </p:nvSpPr>
-        <p:spPr>
-          <a:xfrm>
-            <a:off x="3821246" y="1313892"/>
-            <a:ext cx="4138863" cy="2076473"/>
-          </a:xfrm>
-          <a:prstGeom prst="roundRect">
-            <a:avLst/>
-          </a:prstGeom>
-          <a:solidFill>
-            <a:schemeClr val="bg1"/>
-          </a:solidFill>
-          <a:ln w="19050">
-            <a:solidFill>
-              <a:schemeClr val="tx1"/>
-            </a:solidFill>
-          </a:ln>
-        </p:spPr>
-        <p:style>
-          <a:lnRef idx="2">
-            <a:schemeClr val="accent1">
-              <a:shade val="50000"/>
-            </a:schemeClr>
-          </a:lnRef>
-          <a:fillRef idx="1">
-            <a:schemeClr val="accent1"/>
-          </a:fillRef>
-          <a:effectRef idx="0">
-            <a:schemeClr val="accent1"/>
-          </a:effectRef>
-          <a:fontRef idx="minor">
-            <a:schemeClr val="lt1"/>
-          </a:fontRef>
-        </p:style>
-        <p:txBody>
-          <a:bodyPr rtlCol="0" anchor="t"/>
-          <a:lstStyle/>
-          <a:p>
-            <a:pPr algn="ctr"/>
-            <a:r>
-              <a:rPr lang="it-IT" b="1" dirty="0">
-                <a:solidFill>
-                  <a:schemeClr val="tx1"/>
-                </a:solidFill>
-                <a:latin typeface="Palatino Linotype" panose="02040502050505030304" pitchFamily="18" charset="0"/>
-              </a:rPr>
-              <a:t>REST </a:t>
-            </a:r>
-            <a:r>
-              <a:rPr lang="it-IT" b="1" dirty="0" err="1">
-                <a:solidFill>
-                  <a:schemeClr val="tx1"/>
-                </a:solidFill>
-                <a:latin typeface="Palatino Linotype" panose="02040502050505030304" pitchFamily="18" charset="0"/>
-              </a:rPr>
-              <a:t>request</a:t>
-            </a:r>
-            <a:r>
-              <a:rPr lang="it-IT" b="1" dirty="0">
-                <a:solidFill>
-                  <a:schemeClr val="tx1"/>
-                </a:solidFill>
-                <a:latin typeface="Palatino Linotype" panose="02040502050505030304" pitchFamily="18" charset="0"/>
-              </a:rPr>
-              <a:t> </a:t>
-            </a:r>
-            <a:r>
-              <a:rPr lang="it-IT" b="1" dirty="0" err="1">
-                <a:solidFill>
-                  <a:schemeClr val="tx1"/>
-                </a:solidFill>
-                <a:latin typeface="Palatino Linotype" panose="02040502050505030304" pitchFamily="18" charset="0"/>
-              </a:rPr>
-              <a:t>message</a:t>
-            </a:r>
-            <a:endParaRPr lang="en-GB" b="1" dirty="0">
-              <a:solidFill>
-                <a:schemeClr val="tx1"/>
-              </a:solidFill>
-              <a:latin typeface="Palatino Linotype" panose="02040502050505030304" pitchFamily="18" charset="0"/>
-            </a:endParaRPr>
-          </a:p>
-        </p:txBody>
-      </p:sp>
-      <p:sp>
-        <p:nvSpPr>
-          <p:cNvPr id="22" name="Rettangolo arrotondato 21"/>
-          <p:cNvSpPr/>
-          <p:nvPr/>
-        </p:nvSpPr>
-        <p:spPr>
-          <a:xfrm>
-            <a:off x="5029200" y="2720001"/>
-            <a:ext cx="1852863" cy="623972"/>
-          </a:xfrm>
-          <a:prstGeom prst="roundRect">
-            <a:avLst/>
-          </a:prstGeom>
-          <a:solidFill>
-            <a:schemeClr val="accent6">
-              <a:lumMod val="20000"/>
-              <a:lumOff val="80000"/>
-            </a:schemeClr>
-          </a:solidFill>
-        </p:spPr>
-        <p:style>
-          <a:lnRef idx="2">
-            <a:schemeClr val="dk1"/>
-          </a:lnRef>
-          <a:fillRef idx="1">
-            <a:schemeClr val="lt1"/>
-          </a:fillRef>
-          <a:effectRef idx="0">
-            <a:schemeClr val="dk1"/>
-          </a:effectRef>
-          <a:fontRef idx="minor">
-            <a:schemeClr val="dk1"/>
-          </a:fontRef>
-        </p:style>
-        <p:txBody>
-          <a:bodyPr rtlCol="0" anchor="ctr"/>
-          <a:lstStyle/>
-          <a:p>
-            <a:pPr algn="ctr"/>
-            <a:r>
-              <a:rPr lang="it-IT" sz="1600" dirty="0" err="1">
-                <a:latin typeface="Palatino Linotype" panose="02040502050505030304" pitchFamily="18" charset="0"/>
-              </a:rPr>
-              <a:t>Representation</a:t>
-            </a:r>
-            <a:endParaRPr lang="it-IT" sz="1600" dirty="0">
-              <a:latin typeface="Palatino Linotype" panose="02040502050505030304" pitchFamily="18" charset="0"/>
-            </a:endParaRPr>
-          </a:p>
-          <a:p>
-            <a:pPr algn="ctr"/>
-            <a:r>
-              <a:rPr lang="it-IT" sz="1600" dirty="0">
-                <a:latin typeface="Palatino Linotype" panose="02040502050505030304" pitchFamily="18" charset="0"/>
-              </a:rPr>
-              <a:t>(optional)</a:t>
-            </a:r>
-            <a:endParaRPr lang="en-GB" sz="1600" dirty="0">
-              <a:latin typeface="Palatino Linotype" panose="02040502050505030304" pitchFamily="18" charset="0"/>
-            </a:endParaRPr>
-          </a:p>
-        </p:txBody>
-      </p:sp>
-      <p:sp>
-        <p:nvSpPr>
-          <p:cNvPr id="23" name="Rettangolo arrotondato 22"/>
-          <p:cNvSpPr/>
-          <p:nvPr/>
-        </p:nvSpPr>
-        <p:spPr>
-          <a:xfrm>
-            <a:off x="5835031" y="1806657"/>
-            <a:ext cx="2062847" cy="843206"/>
-          </a:xfrm>
-          <a:prstGeom prst="roundRect">
-            <a:avLst/>
-          </a:prstGeom>
-          <a:solidFill>
-            <a:schemeClr val="accent6">
-              <a:lumMod val="20000"/>
-              <a:lumOff val="80000"/>
-            </a:schemeClr>
-          </a:solidFill>
-        </p:spPr>
-        <p:style>
-          <a:lnRef idx="2">
-            <a:schemeClr val="dk1"/>
-          </a:lnRef>
-          <a:fillRef idx="1">
-            <a:schemeClr val="lt1"/>
-          </a:fillRef>
-          <a:effectRef idx="0">
-            <a:schemeClr val="dk1"/>
-          </a:effectRef>
-          <a:fontRef idx="minor">
-            <a:schemeClr val="dk1"/>
-          </a:fontRef>
-        </p:style>
-        <p:txBody>
-          <a:bodyPr rtlCol="0" anchor="ctr"/>
-          <a:lstStyle/>
-          <a:p>
-            <a:pPr algn="ctr"/>
-            <a:r>
-              <a:rPr lang="it-IT" sz="1600" dirty="0">
-                <a:latin typeface="Palatino Linotype" panose="02040502050505030304" pitchFamily="18" charset="0"/>
-              </a:rPr>
-              <a:t>Resource </a:t>
-            </a:r>
-            <a:r>
-              <a:rPr lang="it-IT" sz="1600" dirty="0" err="1">
-                <a:latin typeface="Palatino Linotype" panose="02040502050505030304" pitchFamily="18" charset="0"/>
-              </a:rPr>
-              <a:t>identifier</a:t>
-            </a:r>
-            <a:endParaRPr lang="it-IT" sz="1600" dirty="0">
-              <a:latin typeface="Palatino Linotype" panose="02040502050505030304" pitchFamily="18" charset="0"/>
-            </a:endParaRPr>
-          </a:p>
-          <a:p>
-            <a:pPr algn="ctr"/>
-            <a:r>
-              <a:rPr lang="it-IT" sz="1600" dirty="0">
-                <a:latin typeface="Palatino Linotype" panose="02040502050505030304" pitchFamily="18" charset="0"/>
-              </a:rPr>
-              <a:t>(</a:t>
-            </a:r>
-            <a:r>
-              <a:rPr lang="it-IT" sz="1600" dirty="0" err="1">
-                <a:latin typeface="Palatino Linotype" panose="02040502050505030304" pitchFamily="18" charset="0"/>
-              </a:rPr>
-              <a:t>mandatory</a:t>
-            </a:r>
-            <a:r>
-              <a:rPr lang="it-IT" sz="1600" dirty="0">
-                <a:latin typeface="Palatino Linotype" panose="02040502050505030304" pitchFamily="18" charset="0"/>
-              </a:rPr>
-              <a:t>)</a:t>
-            </a:r>
-            <a:endParaRPr lang="en-GB" sz="1600" dirty="0">
-              <a:latin typeface="Palatino Linotype" panose="02040502050505030304" pitchFamily="18" charset="0"/>
-            </a:endParaRPr>
-          </a:p>
-        </p:txBody>
-      </p:sp>
-      <p:sp>
-        <p:nvSpPr>
-          <p:cNvPr id="24" name="Rettangolo arrotondato 23"/>
-          <p:cNvSpPr/>
-          <p:nvPr/>
-        </p:nvSpPr>
-        <p:spPr>
-          <a:xfrm>
-            <a:off x="3978875" y="1828719"/>
-            <a:ext cx="1574133" cy="821144"/>
-          </a:xfrm>
-          <a:prstGeom prst="roundRect">
-            <a:avLst/>
-          </a:prstGeom>
-          <a:solidFill>
-            <a:schemeClr val="accent6">
-              <a:lumMod val="20000"/>
-              <a:lumOff val="80000"/>
-            </a:schemeClr>
-          </a:solidFill>
-        </p:spPr>
-        <p:style>
-          <a:lnRef idx="2">
-            <a:schemeClr val="dk1"/>
-          </a:lnRef>
-          <a:fillRef idx="1">
-            <a:schemeClr val="lt1"/>
-          </a:fillRef>
-          <a:effectRef idx="0">
-            <a:schemeClr val="dk1"/>
-          </a:effectRef>
-          <a:fontRef idx="minor">
-            <a:schemeClr val="dk1"/>
-          </a:fontRef>
-        </p:style>
-        <p:txBody>
-          <a:bodyPr rtlCol="0" anchor="ctr"/>
-          <a:lstStyle/>
-          <a:p>
-            <a:pPr algn="ctr"/>
-            <a:r>
-              <a:rPr lang="it-IT" sz="1600" dirty="0">
-                <a:latin typeface="Palatino Linotype" panose="02040502050505030304" pitchFamily="18" charset="0"/>
-              </a:rPr>
-              <a:t>Control data</a:t>
-            </a:r>
-          </a:p>
-          <a:p>
-            <a:pPr algn="ctr"/>
-            <a:r>
-              <a:rPr lang="it-IT" sz="1600" dirty="0">
-                <a:latin typeface="Palatino Linotype" panose="02040502050505030304" pitchFamily="18" charset="0"/>
-              </a:rPr>
-              <a:t>(</a:t>
-            </a:r>
-            <a:r>
-              <a:rPr lang="it-IT" sz="1600" dirty="0" err="1">
-                <a:latin typeface="Palatino Linotype" panose="02040502050505030304" pitchFamily="18" charset="0"/>
-              </a:rPr>
-              <a:t>mandatory</a:t>
-            </a:r>
-            <a:r>
-              <a:rPr lang="it-IT" sz="1600" dirty="0">
-                <a:latin typeface="Palatino Linotype" panose="02040502050505030304" pitchFamily="18" charset="0"/>
-              </a:rPr>
-              <a:t>)</a:t>
-            </a:r>
-            <a:endParaRPr lang="en-GB" sz="1600" dirty="0">
-              <a:latin typeface="Palatino Linotype" panose="02040502050505030304" pitchFamily="18" charset="0"/>
-            </a:endParaRPr>
-          </a:p>
-        </p:txBody>
-      </p:sp>
-      <p:sp>
-        <p:nvSpPr>
           <p:cNvPr id="3" name="Segnaposto numero diapositiva 2"/>
           <p:cNvSpPr>
             <a:spLocks noGrp="1"/>
@@ -8622,7 +7591,7 @@
     </p:spTree>
     <p:extLst>
       <p:ext uri="{BB962C8B-B14F-4D97-AF65-F5344CB8AC3E}">
-        <p14:creationId xmlns:p14="http://schemas.microsoft.com/office/powerpoint/2010/main" val="1812340316"/>
+        <p14:creationId xmlns:p14="http://schemas.microsoft.com/office/powerpoint/2010/main" val="2761484841"/>
       </p:ext>
     </p:extLst>
   </p:cSld>
@@ -8666,6 +7635,1137 @@
           <a:p>
             <a:r>
               <a:rPr lang="it-IT" dirty="0"/>
+              <a:t>REST self-</a:t>
+            </a:r>
+            <a:r>
+              <a:rPr lang="it-IT" dirty="0" err="1"/>
+              <a:t>descriptive</a:t>
+            </a:r>
+            <a:r>
+              <a:rPr lang="it-IT" dirty="0"/>
+              <a:t> </a:t>
+            </a:r>
+            <a:r>
+              <a:rPr lang="it-IT" dirty="0" err="1"/>
+              <a:t>messages</a:t>
+            </a:r>
+            <a:endParaRPr lang="en-GB" dirty="0"/>
+          </a:p>
+        </p:txBody>
+      </p:sp>
+      <p:sp>
+        <p:nvSpPr>
+          <p:cNvPr id="4" name="Rettangolo 3"/>
+          <p:cNvSpPr/>
+          <p:nvPr/>
+        </p:nvSpPr>
+        <p:spPr>
+          <a:xfrm>
+            <a:off x="473459" y="3308140"/>
+            <a:ext cx="2225842" cy="1287379"/>
+          </a:xfrm>
+          <a:prstGeom prst="rect">
+            <a:avLst/>
+          </a:prstGeom>
+          <a:ln w="38100">
+            <a:solidFill>
+              <a:srgbClr val="00B050"/>
+            </a:solidFill>
+          </a:ln>
+        </p:spPr>
+        <p:style>
+          <a:lnRef idx="2">
+            <a:schemeClr val="accent6"/>
+          </a:lnRef>
+          <a:fillRef idx="1">
+            <a:schemeClr val="lt1"/>
+          </a:fillRef>
+          <a:effectRef idx="0">
+            <a:schemeClr val="accent6"/>
+          </a:effectRef>
+          <a:fontRef idx="minor">
+            <a:schemeClr val="dk1"/>
+          </a:fontRef>
+        </p:style>
+        <p:txBody>
+          <a:bodyPr rtlCol="0" anchor="ctr"/>
+          <a:lstStyle/>
+          <a:p>
+            <a:pPr algn="ctr"/>
+            <a:r>
+              <a:rPr lang="it-IT" sz="2800" dirty="0">
+                <a:latin typeface="Palatino Linotype" panose="02040502050505030304" pitchFamily="18" charset="0"/>
+              </a:rPr>
+              <a:t>Client</a:t>
+            </a:r>
+            <a:endParaRPr lang="en-GB" sz="2800" dirty="0">
+              <a:latin typeface="Palatino Linotype" panose="02040502050505030304" pitchFamily="18" charset="0"/>
+            </a:endParaRPr>
+          </a:p>
+        </p:txBody>
+      </p:sp>
+      <p:sp>
+        <p:nvSpPr>
+          <p:cNvPr id="5" name="Rettangolo 4"/>
+          <p:cNvSpPr/>
+          <p:nvPr/>
+        </p:nvSpPr>
+        <p:spPr>
+          <a:xfrm>
+            <a:off x="9035497" y="2971801"/>
+            <a:ext cx="2225842" cy="2111542"/>
+          </a:xfrm>
+          <a:prstGeom prst="rect">
+            <a:avLst/>
+          </a:prstGeom>
+          <a:ln w="38100">
+            <a:solidFill>
+              <a:srgbClr val="00B050"/>
+            </a:solidFill>
+          </a:ln>
+        </p:spPr>
+        <p:style>
+          <a:lnRef idx="2">
+            <a:schemeClr val="accent6"/>
+          </a:lnRef>
+          <a:fillRef idx="1">
+            <a:schemeClr val="lt1"/>
+          </a:fillRef>
+          <a:effectRef idx="0">
+            <a:schemeClr val="accent6"/>
+          </a:effectRef>
+          <a:fontRef idx="minor">
+            <a:schemeClr val="dk1"/>
+          </a:fontRef>
+        </p:style>
+        <p:txBody>
+          <a:bodyPr rtlCol="0" anchor="t"/>
+          <a:lstStyle/>
+          <a:p>
+            <a:pPr algn="ctr"/>
+            <a:r>
+              <a:rPr lang="it-IT" sz="2400" dirty="0">
+                <a:latin typeface="Palatino Linotype" panose="02040502050505030304" pitchFamily="18" charset="0"/>
+              </a:rPr>
+              <a:t>Server</a:t>
+            </a:r>
+          </a:p>
+        </p:txBody>
+      </p:sp>
+      <p:cxnSp>
+        <p:nvCxnSpPr>
+          <p:cNvPr id="6" name="Connettore 2 5"/>
+          <p:cNvCxnSpPr/>
+          <p:nvPr/>
+        </p:nvCxnSpPr>
+        <p:spPr>
+          <a:xfrm>
+            <a:off x="3441031" y="3595773"/>
+            <a:ext cx="4866774" cy="0"/>
+          </a:xfrm>
+          <a:prstGeom prst="straightConnector1">
+            <a:avLst/>
+          </a:prstGeom>
+          <a:ln w="28575">
+            <a:solidFill>
+              <a:schemeClr val="tx1"/>
+            </a:solidFill>
+            <a:tailEnd type="triangle"/>
+          </a:ln>
+        </p:spPr>
+        <p:style>
+          <a:lnRef idx="1">
+            <a:schemeClr val="accent1"/>
+          </a:lnRef>
+          <a:fillRef idx="0">
+            <a:schemeClr val="accent1"/>
+          </a:fillRef>
+          <a:effectRef idx="0">
+            <a:schemeClr val="accent1"/>
+          </a:effectRef>
+          <a:fontRef idx="minor">
+            <a:schemeClr val="tx1"/>
+          </a:fontRef>
+        </p:style>
+      </p:cxnSp>
+      <p:cxnSp>
+        <p:nvCxnSpPr>
+          <p:cNvPr id="8" name="Connettore 2 7"/>
+          <p:cNvCxnSpPr/>
+          <p:nvPr/>
+        </p:nvCxnSpPr>
+        <p:spPr>
+          <a:xfrm flipH="1">
+            <a:off x="3441031" y="4351945"/>
+            <a:ext cx="4788000" cy="0"/>
+          </a:xfrm>
+          <a:prstGeom prst="straightConnector1">
+            <a:avLst/>
+          </a:prstGeom>
+          <a:ln w="28575">
+            <a:solidFill>
+              <a:schemeClr val="tx1"/>
+            </a:solidFill>
+            <a:tailEnd type="triangle"/>
+          </a:ln>
+        </p:spPr>
+        <p:style>
+          <a:lnRef idx="1">
+            <a:schemeClr val="accent1"/>
+          </a:lnRef>
+          <a:fillRef idx="0">
+            <a:schemeClr val="accent1"/>
+          </a:fillRef>
+          <a:effectRef idx="0">
+            <a:schemeClr val="accent1"/>
+          </a:effectRef>
+          <a:fontRef idx="minor">
+            <a:schemeClr val="tx1"/>
+          </a:fontRef>
+        </p:style>
+      </p:cxnSp>
+      <p:sp>
+        <p:nvSpPr>
+          <p:cNvPr id="9" name="Ovale 8"/>
+          <p:cNvSpPr/>
+          <p:nvPr/>
+        </p:nvSpPr>
+        <p:spPr>
+          <a:xfrm>
+            <a:off x="9539821" y="3588897"/>
+            <a:ext cx="1217194" cy="877348"/>
+          </a:xfrm>
+          <a:prstGeom prst="ellipse">
+            <a:avLst/>
+          </a:prstGeom>
+          <a:solidFill>
+            <a:srgbClr val="00B050"/>
+          </a:solidFill>
+          <a:ln>
+            <a:solidFill>
+              <a:schemeClr val="tx1"/>
+            </a:solidFill>
+          </a:ln>
+        </p:spPr>
+        <p:style>
+          <a:lnRef idx="2">
+            <a:schemeClr val="accent1">
+              <a:shade val="50000"/>
+            </a:schemeClr>
+          </a:lnRef>
+          <a:fillRef idx="1">
+            <a:schemeClr val="accent1"/>
+          </a:fillRef>
+          <a:effectRef idx="0">
+            <a:schemeClr val="accent1"/>
+          </a:effectRef>
+          <a:fontRef idx="minor">
+            <a:schemeClr val="lt1"/>
+          </a:fontRef>
+        </p:style>
+        <p:txBody>
+          <a:bodyPr rtlCol="0" anchor="ctr"/>
+          <a:lstStyle/>
+          <a:p>
+            <a:pPr algn="ctr"/>
+            <a:r>
+              <a:rPr lang="it-IT" dirty="0" err="1">
+                <a:latin typeface="Palatino Linotype" panose="02040502050505030304" pitchFamily="18" charset="0"/>
+              </a:rPr>
+              <a:t>Entity</a:t>
+            </a:r>
+            <a:endParaRPr lang="en-GB" dirty="0">
+              <a:latin typeface="Palatino Linotype" panose="02040502050505030304" pitchFamily="18" charset="0"/>
+            </a:endParaRPr>
+          </a:p>
+          <a:p>
+            <a:pPr algn="ctr"/>
+            <a:endParaRPr lang="it-IT" dirty="0">
+              <a:latin typeface="Palatino Linotype" panose="02040502050505030304" pitchFamily="18" charset="0"/>
+            </a:endParaRPr>
+          </a:p>
+        </p:txBody>
+      </p:sp>
+      <p:sp>
+        <p:nvSpPr>
+          <p:cNvPr id="10" name="Rettangolo 9"/>
+          <p:cNvSpPr/>
+          <p:nvPr/>
+        </p:nvSpPr>
+        <p:spPr>
+          <a:xfrm>
+            <a:off x="8897421" y="3341133"/>
+            <a:ext cx="264695" cy="1330128"/>
+          </a:xfrm>
+          <a:prstGeom prst="rect">
+            <a:avLst/>
+          </a:prstGeom>
+        </p:spPr>
+        <p:style>
+          <a:lnRef idx="2">
+            <a:schemeClr val="dk1">
+              <a:shade val="50000"/>
+            </a:schemeClr>
+          </a:lnRef>
+          <a:fillRef idx="1">
+            <a:schemeClr val="dk1"/>
+          </a:fillRef>
+          <a:effectRef idx="0">
+            <a:schemeClr val="dk1"/>
+          </a:effectRef>
+          <a:fontRef idx="minor">
+            <a:schemeClr val="lt1"/>
+          </a:fontRef>
+        </p:style>
+        <p:txBody>
+          <a:bodyPr rtlCol="0" anchor="ctr"/>
+          <a:lstStyle/>
+          <a:p>
+            <a:pPr algn="ctr"/>
+            <a:endParaRPr lang="en-GB"/>
+          </a:p>
+        </p:txBody>
+      </p:sp>
+      <p:sp>
+        <p:nvSpPr>
+          <p:cNvPr id="11" name="Rettangolo 10"/>
+          <p:cNvSpPr/>
+          <p:nvPr/>
+        </p:nvSpPr>
+        <p:spPr>
+          <a:xfrm>
+            <a:off x="2566953" y="3437433"/>
+            <a:ext cx="264695" cy="986043"/>
+          </a:xfrm>
+          <a:prstGeom prst="rect">
+            <a:avLst/>
+          </a:prstGeom>
+        </p:spPr>
+        <p:style>
+          <a:lnRef idx="2">
+            <a:schemeClr val="dk1">
+              <a:shade val="50000"/>
+            </a:schemeClr>
+          </a:lnRef>
+          <a:fillRef idx="1">
+            <a:schemeClr val="dk1"/>
+          </a:fillRef>
+          <a:effectRef idx="0">
+            <a:schemeClr val="dk1"/>
+          </a:effectRef>
+          <a:fontRef idx="minor">
+            <a:schemeClr val="lt1"/>
+          </a:fontRef>
+        </p:style>
+        <p:txBody>
+          <a:bodyPr rtlCol="0" anchor="ctr"/>
+          <a:lstStyle/>
+          <a:p>
+            <a:pPr algn="ctr"/>
+            <a:endParaRPr lang="en-GB"/>
+          </a:p>
+        </p:txBody>
+      </p:sp>
+      <p:cxnSp>
+        <p:nvCxnSpPr>
+          <p:cNvPr id="12" name="Connettore 2 11"/>
+          <p:cNvCxnSpPr/>
+          <p:nvPr/>
+        </p:nvCxnSpPr>
+        <p:spPr>
+          <a:xfrm>
+            <a:off x="9211391" y="3477127"/>
+            <a:ext cx="475247" cy="186489"/>
+          </a:xfrm>
+          <a:prstGeom prst="straightConnector1">
+            <a:avLst/>
+          </a:prstGeom>
+          <a:ln w="28575">
+            <a:solidFill>
+              <a:schemeClr val="tx1"/>
+            </a:solidFill>
+            <a:prstDash val="sysDash"/>
+            <a:tailEnd type="triangle"/>
+          </a:ln>
+        </p:spPr>
+        <p:style>
+          <a:lnRef idx="1">
+            <a:schemeClr val="accent1"/>
+          </a:lnRef>
+          <a:fillRef idx="0">
+            <a:schemeClr val="accent1"/>
+          </a:fillRef>
+          <a:effectRef idx="0">
+            <a:schemeClr val="accent1"/>
+          </a:effectRef>
+          <a:fontRef idx="minor">
+            <a:schemeClr val="tx1"/>
+          </a:fontRef>
+        </p:style>
+      </p:cxnSp>
+      <p:cxnSp>
+        <p:nvCxnSpPr>
+          <p:cNvPr id="13" name="Connettore 2 12"/>
+          <p:cNvCxnSpPr/>
+          <p:nvPr/>
+        </p:nvCxnSpPr>
+        <p:spPr>
+          <a:xfrm flipH="1">
+            <a:off x="9211391" y="4325353"/>
+            <a:ext cx="423679" cy="232001"/>
+          </a:xfrm>
+          <a:prstGeom prst="straightConnector1">
+            <a:avLst/>
+          </a:prstGeom>
+          <a:ln w="28575">
+            <a:solidFill>
+              <a:schemeClr val="tx1"/>
+            </a:solidFill>
+            <a:prstDash val="sysDash"/>
+            <a:tailEnd type="triangle"/>
+          </a:ln>
+        </p:spPr>
+        <p:style>
+          <a:lnRef idx="1">
+            <a:schemeClr val="accent1"/>
+          </a:lnRef>
+          <a:fillRef idx="0">
+            <a:schemeClr val="accent1"/>
+          </a:fillRef>
+          <a:effectRef idx="0">
+            <a:schemeClr val="accent1"/>
+          </a:effectRef>
+          <a:fontRef idx="minor">
+            <a:schemeClr val="tx1"/>
+          </a:fontRef>
+        </p:style>
+      </p:cxnSp>
+      <p:sp>
+        <p:nvSpPr>
+          <p:cNvPr id="14" name="CasellaDiTesto 13"/>
+          <p:cNvSpPr txBox="1"/>
+          <p:nvPr/>
+        </p:nvSpPr>
+        <p:spPr>
+          <a:xfrm>
+            <a:off x="9531372" y="3975893"/>
+            <a:ext cx="1553076" cy="307777"/>
+          </a:xfrm>
+          <a:prstGeom prst="rect">
+            <a:avLst/>
+          </a:prstGeom>
+          <a:noFill/>
+        </p:spPr>
+        <p:txBody>
+          <a:bodyPr wrap="square" rtlCol="0">
+            <a:spAutoFit/>
+          </a:bodyPr>
+          <a:lstStyle/>
+          <a:p>
+            <a:r>
+              <a:rPr lang="it-IT" sz="1400" dirty="0">
+                <a:solidFill>
+                  <a:schemeClr val="bg1"/>
+                </a:solidFill>
+                <a:latin typeface="Palatino Linotype" panose="02040502050505030304" pitchFamily="18" charset="0"/>
+              </a:rPr>
+              <a:t>(</a:t>
+            </a:r>
+            <a:r>
+              <a:rPr lang="it-IT" sz="1400" dirty="0" err="1">
+                <a:solidFill>
+                  <a:schemeClr val="bg1"/>
+                </a:solidFill>
+                <a:latin typeface="Palatino Linotype" panose="02040502050505030304" pitchFamily="18" charset="0"/>
+              </a:rPr>
+              <a:t>raw</a:t>
+            </a:r>
+            <a:r>
+              <a:rPr lang="it-IT" sz="1400" dirty="0">
+                <a:solidFill>
+                  <a:schemeClr val="bg1"/>
+                </a:solidFill>
+                <a:latin typeface="Palatino Linotype" panose="02040502050505030304" pitchFamily="18" charset="0"/>
+              </a:rPr>
+              <a:t> format)</a:t>
+            </a:r>
+            <a:endParaRPr lang="en-GB" sz="1400" dirty="0">
+              <a:solidFill>
+                <a:schemeClr val="bg1"/>
+              </a:solidFill>
+              <a:latin typeface="Palatino Linotype" panose="02040502050505030304" pitchFamily="18" charset="0"/>
+            </a:endParaRPr>
+          </a:p>
+        </p:txBody>
+      </p:sp>
+      <p:sp>
+        <p:nvSpPr>
+          <p:cNvPr id="17" name="Rettangolo arrotondato 16"/>
+          <p:cNvSpPr/>
+          <p:nvPr/>
+        </p:nvSpPr>
+        <p:spPr>
+          <a:xfrm>
+            <a:off x="3774689" y="4557354"/>
+            <a:ext cx="4138863" cy="2100055"/>
+          </a:xfrm>
+          <a:prstGeom prst="roundRect">
+            <a:avLst/>
+          </a:prstGeom>
+          <a:solidFill>
+            <a:schemeClr val="bg1"/>
+          </a:solidFill>
+          <a:ln w="19050">
+            <a:solidFill>
+              <a:schemeClr val="tx1"/>
+            </a:solidFill>
+          </a:ln>
+        </p:spPr>
+        <p:style>
+          <a:lnRef idx="2">
+            <a:schemeClr val="accent1">
+              <a:shade val="50000"/>
+            </a:schemeClr>
+          </a:lnRef>
+          <a:fillRef idx="1">
+            <a:schemeClr val="accent1"/>
+          </a:fillRef>
+          <a:effectRef idx="0">
+            <a:schemeClr val="accent1"/>
+          </a:effectRef>
+          <a:fontRef idx="minor">
+            <a:schemeClr val="lt1"/>
+          </a:fontRef>
+        </p:style>
+        <p:txBody>
+          <a:bodyPr rtlCol="0" anchor="t"/>
+          <a:lstStyle/>
+          <a:p>
+            <a:pPr algn="ctr"/>
+            <a:r>
+              <a:rPr lang="it-IT" b="1" dirty="0">
+                <a:solidFill>
+                  <a:schemeClr val="tx1"/>
+                </a:solidFill>
+                <a:latin typeface="Palatino Linotype" panose="02040502050505030304" pitchFamily="18" charset="0"/>
+              </a:rPr>
+              <a:t>REST </a:t>
+            </a:r>
+            <a:r>
+              <a:rPr lang="it-IT" b="1" dirty="0" err="1">
+                <a:solidFill>
+                  <a:schemeClr val="tx1"/>
+                </a:solidFill>
+                <a:latin typeface="Palatino Linotype" panose="02040502050505030304" pitchFamily="18" charset="0"/>
+              </a:rPr>
+              <a:t>response</a:t>
+            </a:r>
+            <a:r>
+              <a:rPr lang="it-IT" b="1" dirty="0">
+                <a:solidFill>
+                  <a:schemeClr val="tx1"/>
+                </a:solidFill>
+                <a:latin typeface="Palatino Linotype" panose="02040502050505030304" pitchFamily="18" charset="0"/>
+              </a:rPr>
+              <a:t> </a:t>
+            </a:r>
+            <a:r>
+              <a:rPr lang="it-IT" b="1" dirty="0" err="1">
+                <a:solidFill>
+                  <a:schemeClr val="tx1"/>
+                </a:solidFill>
+                <a:latin typeface="Palatino Linotype" panose="02040502050505030304" pitchFamily="18" charset="0"/>
+              </a:rPr>
+              <a:t>message</a:t>
+            </a:r>
+            <a:endParaRPr lang="en-GB" b="1" dirty="0">
+              <a:solidFill>
+                <a:schemeClr val="tx1"/>
+              </a:solidFill>
+              <a:latin typeface="Palatino Linotype" panose="02040502050505030304" pitchFamily="18" charset="0"/>
+            </a:endParaRPr>
+          </a:p>
+        </p:txBody>
+      </p:sp>
+      <p:sp>
+        <p:nvSpPr>
+          <p:cNvPr id="18" name="Rettangolo arrotondato 17"/>
+          <p:cNvSpPr/>
+          <p:nvPr/>
+        </p:nvSpPr>
+        <p:spPr>
+          <a:xfrm>
+            <a:off x="3949365" y="5691188"/>
+            <a:ext cx="1852863" cy="843206"/>
+          </a:xfrm>
+          <a:prstGeom prst="roundRect">
+            <a:avLst/>
+          </a:prstGeom>
+          <a:solidFill>
+            <a:schemeClr val="accent6">
+              <a:lumMod val="20000"/>
+              <a:lumOff val="80000"/>
+            </a:schemeClr>
+          </a:solidFill>
+        </p:spPr>
+        <p:style>
+          <a:lnRef idx="2">
+            <a:schemeClr val="dk1"/>
+          </a:lnRef>
+          <a:fillRef idx="1">
+            <a:schemeClr val="lt1"/>
+          </a:fillRef>
+          <a:effectRef idx="0">
+            <a:schemeClr val="dk1"/>
+          </a:effectRef>
+          <a:fontRef idx="minor">
+            <a:schemeClr val="dk1"/>
+          </a:fontRef>
+        </p:style>
+        <p:txBody>
+          <a:bodyPr rtlCol="0" anchor="ctr"/>
+          <a:lstStyle/>
+          <a:p>
+            <a:pPr algn="ctr"/>
+            <a:r>
+              <a:rPr lang="it-IT" sz="1600" dirty="0" err="1">
+                <a:latin typeface="Palatino Linotype" panose="02040502050505030304" pitchFamily="18" charset="0"/>
+              </a:rPr>
+              <a:t>Representation</a:t>
+            </a:r>
+            <a:endParaRPr lang="it-IT" sz="1600" dirty="0">
+              <a:latin typeface="Palatino Linotype" panose="02040502050505030304" pitchFamily="18" charset="0"/>
+            </a:endParaRPr>
+          </a:p>
+          <a:p>
+            <a:pPr algn="ctr"/>
+            <a:r>
+              <a:rPr lang="it-IT" sz="1600" dirty="0">
+                <a:latin typeface="Palatino Linotype" panose="02040502050505030304" pitchFamily="18" charset="0"/>
+              </a:rPr>
+              <a:t>(optional)</a:t>
+            </a:r>
+            <a:endParaRPr lang="en-GB" sz="1600" dirty="0">
+              <a:latin typeface="Palatino Linotype" panose="02040502050505030304" pitchFamily="18" charset="0"/>
+            </a:endParaRPr>
+          </a:p>
+        </p:txBody>
+      </p:sp>
+      <p:sp>
+        <p:nvSpPr>
+          <p:cNvPr id="19" name="Rettangolo arrotondato 18"/>
+          <p:cNvSpPr/>
+          <p:nvPr/>
+        </p:nvSpPr>
+        <p:spPr>
+          <a:xfrm>
+            <a:off x="5913521" y="5691187"/>
+            <a:ext cx="1852863" cy="843207"/>
+          </a:xfrm>
+          <a:prstGeom prst="roundRect">
+            <a:avLst/>
+          </a:prstGeom>
+          <a:solidFill>
+            <a:schemeClr val="accent6">
+              <a:lumMod val="20000"/>
+              <a:lumOff val="80000"/>
+            </a:schemeClr>
+          </a:solidFill>
+        </p:spPr>
+        <p:style>
+          <a:lnRef idx="2">
+            <a:schemeClr val="dk1"/>
+          </a:lnRef>
+          <a:fillRef idx="1">
+            <a:schemeClr val="lt1"/>
+          </a:fillRef>
+          <a:effectRef idx="0">
+            <a:schemeClr val="dk1"/>
+          </a:effectRef>
+          <a:fontRef idx="minor">
+            <a:schemeClr val="dk1"/>
+          </a:fontRef>
+        </p:style>
+        <p:txBody>
+          <a:bodyPr rtlCol="0" anchor="ctr"/>
+          <a:lstStyle/>
+          <a:p>
+            <a:pPr algn="ctr"/>
+            <a:r>
+              <a:rPr lang="it-IT" sz="1600" dirty="0">
+                <a:latin typeface="Palatino Linotype" panose="02040502050505030304" pitchFamily="18" charset="0"/>
+              </a:rPr>
+              <a:t>Resource </a:t>
+            </a:r>
+            <a:r>
+              <a:rPr lang="it-IT" sz="1600" dirty="0" err="1">
+                <a:latin typeface="Palatino Linotype" panose="02040502050505030304" pitchFamily="18" charset="0"/>
+              </a:rPr>
+              <a:t>metadata</a:t>
+            </a:r>
+            <a:r>
+              <a:rPr lang="it-IT" sz="1600" dirty="0">
+                <a:latin typeface="Palatino Linotype" panose="02040502050505030304" pitchFamily="18" charset="0"/>
+              </a:rPr>
+              <a:t> (optional)</a:t>
+            </a:r>
+            <a:endParaRPr lang="en-GB" sz="1600" dirty="0">
+              <a:latin typeface="Palatino Linotype" panose="02040502050505030304" pitchFamily="18" charset="0"/>
+            </a:endParaRPr>
+          </a:p>
+        </p:txBody>
+      </p:sp>
+      <p:sp>
+        <p:nvSpPr>
+          <p:cNvPr id="20" name="Rettangolo arrotondato 19"/>
+          <p:cNvSpPr/>
+          <p:nvPr/>
+        </p:nvSpPr>
+        <p:spPr>
+          <a:xfrm>
+            <a:off x="5093366" y="5072180"/>
+            <a:ext cx="1574133" cy="558599"/>
+          </a:xfrm>
+          <a:prstGeom prst="roundRect">
+            <a:avLst/>
+          </a:prstGeom>
+          <a:solidFill>
+            <a:schemeClr val="accent6">
+              <a:lumMod val="20000"/>
+              <a:lumOff val="80000"/>
+            </a:schemeClr>
+          </a:solidFill>
+        </p:spPr>
+        <p:style>
+          <a:lnRef idx="2">
+            <a:schemeClr val="dk1"/>
+          </a:lnRef>
+          <a:fillRef idx="1">
+            <a:schemeClr val="lt1"/>
+          </a:fillRef>
+          <a:effectRef idx="0">
+            <a:schemeClr val="dk1"/>
+          </a:effectRef>
+          <a:fontRef idx="minor">
+            <a:schemeClr val="dk1"/>
+          </a:fontRef>
+        </p:style>
+        <p:txBody>
+          <a:bodyPr rtlCol="0" anchor="ctr"/>
+          <a:lstStyle/>
+          <a:p>
+            <a:pPr algn="ctr"/>
+            <a:r>
+              <a:rPr lang="it-IT" sz="1600" dirty="0">
+                <a:latin typeface="Palatino Linotype" panose="02040502050505030304" pitchFamily="18" charset="0"/>
+              </a:rPr>
+              <a:t>Control data</a:t>
+            </a:r>
+          </a:p>
+          <a:p>
+            <a:pPr algn="ctr"/>
+            <a:r>
+              <a:rPr lang="it-IT" sz="1600" dirty="0">
+                <a:latin typeface="Palatino Linotype" panose="02040502050505030304" pitchFamily="18" charset="0"/>
+              </a:rPr>
+              <a:t>(</a:t>
+            </a:r>
+            <a:r>
+              <a:rPr lang="it-IT" sz="1600" dirty="0" err="1">
+                <a:latin typeface="Palatino Linotype" panose="02040502050505030304" pitchFamily="18" charset="0"/>
+              </a:rPr>
+              <a:t>mandatory</a:t>
+            </a:r>
+            <a:r>
+              <a:rPr lang="it-IT" sz="1600" dirty="0">
+                <a:latin typeface="Palatino Linotype" panose="02040502050505030304" pitchFamily="18" charset="0"/>
+              </a:rPr>
+              <a:t>)</a:t>
+            </a:r>
+            <a:endParaRPr lang="en-GB" sz="1600" dirty="0">
+              <a:latin typeface="Palatino Linotype" panose="02040502050505030304" pitchFamily="18" charset="0"/>
+            </a:endParaRPr>
+          </a:p>
+        </p:txBody>
+      </p:sp>
+      <p:sp>
+        <p:nvSpPr>
+          <p:cNvPr id="21" name="Rettangolo arrotondato 20"/>
+          <p:cNvSpPr/>
+          <p:nvPr/>
+        </p:nvSpPr>
+        <p:spPr>
+          <a:xfrm>
+            <a:off x="3821246" y="1313892"/>
+            <a:ext cx="4138863" cy="2076473"/>
+          </a:xfrm>
+          <a:prstGeom prst="roundRect">
+            <a:avLst/>
+          </a:prstGeom>
+          <a:solidFill>
+            <a:schemeClr val="bg1"/>
+          </a:solidFill>
+          <a:ln w="19050">
+            <a:solidFill>
+              <a:schemeClr val="tx1"/>
+            </a:solidFill>
+          </a:ln>
+        </p:spPr>
+        <p:style>
+          <a:lnRef idx="2">
+            <a:schemeClr val="accent1">
+              <a:shade val="50000"/>
+            </a:schemeClr>
+          </a:lnRef>
+          <a:fillRef idx="1">
+            <a:schemeClr val="accent1"/>
+          </a:fillRef>
+          <a:effectRef idx="0">
+            <a:schemeClr val="accent1"/>
+          </a:effectRef>
+          <a:fontRef idx="minor">
+            <a:schemeClr val="lt1"/>
+          </a:fontRef>
+        </p:style>
+        <p:txBody>
+          <a:bodyPr rtlCol="0" anchor="t"/>
+          <a:lstStyle/>
+          <a:p>
+            <a:pPr algn="ctr"/>
+            <a:r>
+              <a:rPr lang="it-IT" b="1" dirty="0">
+                <a:solidFill>
+                  <a:schemeClr val="tx1"/>
+                </a:solidFill>
+                <a:latin typeface="Palatino Linotype" panose="02040502050505030304" pitchFamily="18" charset="0"/>
+              </a:rPr>
+              <a:t>REST </a:t>
+            </a:r>
+            <a:r>
+              <a:rPr lang="it-IT" b="1" dirty="0" err="1">
+                <a:solidFill>
+                  <a:schemeClr val="tx1"/>
+                </a:solidFill>
+                <a:latin typeface="Palatino Linotype" panose="02040502050505030304" pitchFamily="18" charset="0"/>
+              </a:rPr>
+              <a:t>request</a:t>
+            </a:r>
+            <a:r>
+              <a:rPr lang="it-IT" b="1" dirty="0">
+                <a:solidFill>
+                  <a:schemeClr val="tx1"/>
+                </a:solidFill>
+                <a:latin typeface="Palatino Linotype" panose="02040502050505030304" pitchFamily="18" charset="0"/>
+              </a:rPr>
+              <a:t> </a:t>
+            </a:r>
+            <a:r>
+              <a:rPr lang="it-IT" b="1" dirty="0" err="1">
+                <a:solidFill>
+                  <a:schemeClr val="tx1"/>
+                </a:solidFill>
+                <a:latin typeface="Palatino Linotype" panose="02040502050505030304" pitchFamily="18" charset="0"/>
+              </a:rPr>
+              <a:t>message</a:t>
+            </a:r>
+            <a:endParaRPr lang="en-GB" b="1" dirty="0">
+              <a:solidFill>
+                <a:schemeClr val="tx1"/>
+              </a:solidFill>
+              <a:latin typeface="Palatino Linotype" panose="02040502050505030304" pitchFamily="18" charset="0"/>
+            </a:endParaRPr>
+          </a:p>
+        </p:txBody>
+      </p:sp>
+      <p:sp>
+        <p:nvSpPr>
+          <p:cNvPr id="22" name="Rettangolo arrotondato 21"/>
+          <p:cNvSpPr/>
+          <p:nvPr/>
+        </p:nvSpPr>
+        <p:spPr>
+          <a:xfrm>
+            <a:off x="5029200" y="2720001"/>
+            <a:ext cx="1852863" cy="623972"/>
+          </a:xfrm>
+          <a:prstGeom prst="roundRect">
+            <a:avLst/>
+          </a:prstGeom>
+          <a:solidFill>
+            <a:schemeClr val="accent6">
+              <a:lumMod val="20000"/>
+              <a:lumOff val="80000"/>
+            </a:schemeClr>
+          </a:solidFill>
+        </p:spPr>
+        <p:style>
+          <a:lnRef idx="2">
+            <a:schemeClr val="dk1"/>
+          </a:lnRef>
+          <a:fillRef idx="1">
+            <a:schemeClr val="lt1"/>
+          </a:fillRef>
+          <a:effectRef idx="0">
+            <a:schemeClr val="dk1"/>
+          </a:effectRef>
+          <a:fontRef idx="minor">
+            <a:schemeClr val="dk1"/>
+          </a:fontRef>
+        </p:style>
+        <p:txBody>
+          <a:bodyPr rtlCol="0" anchor="ctr"/>
+          <a:lstStyle/>
+          <a:p>
+            <a:pPr algn="ctr"/>
+            <a:r>
+              <a:rPr lang="it-IT" sz="1600" dirty="0" err="1">
+                <a:latin typeface="Palatino Linotype" panose="02040502050505030304" pitchFamily="18" charset="0"/>
+              </a:rPr>
+              <a:t>Representation</a:t>
+            </a:r>
+            <a:endParaRPr lang="it-IT" sz="1600" dirty="0">
+              <a:latin typeface="Palatino Linotype" panose="02040502050505030304" pitchFamily="18" charset="0"/>
+            </a:endParaRPr>
+          </a:p>
+          <a:p>
+            <a:pPr algn="ctr"/>
+            <a:r>
+              <a:rPr lang="it-IT" sz="1600" dirty="0">
+                <a:latin typeface="Palatino Linotype" panose="02040502050505030304" pitchFamily="18" charset="0"/>
+              </a:rPr>
+              <a:t>(optional)</a:t>
+            </a:r>
+            <a:endParaRPr lang="en-GB" sz="1600" dirty="0">
+              <a:latin typeface="Palatino Linotype" panose="02040502050505030304" pitchFamily="18" charset="0"/>
+            </a:endParaRPr>
+          </a:p>
+        </p:txBody>
+      </p:sp>
+      <p:sp>
+        <p:nvSpPr>
+          <p:cNvPr id="23" name="Rettangolo arrotondato 22"/>
+          <p:cNvSpPr/>
+          <p:nvPr/>
+        </p:nvSpPr>
+        <p:spPr>
+          <a:xfrm>
+            <a:off x="5835031" y="1806657"/>
+            <a:ext cx="2062847" cy="843206"/>
+          </a:xfrm>
+          <a:prstGeom prst="roundRect">
+            <a:avLst/>
+          </a:prstGeom>
+          <a:solidFill>
+            <a:schemeClr val="accent6">
+              <a:lumMod val="20000"/>
+              <a:lumOff val="80000"/>
+            </a:schemeClr>
+          </a:solidFill>
+        </p:spPr>
+        <p:style>
+          <a:lnRef idx="2">
+            <a:schemeClr val="dk1"/>
+          </a:lnRef>
+          <a:fillRef idx="1">
+            <a:schemeClr val="lt1"/>
+          </a:fillRef>
+          <a:effectRef idx="0">
+            <a:schemeClr val="dk1"/>
+          </a:effectRef>
+          <a:fontRef idx="minor">
+            <a:schemeClr val="dk1"/>
+          </a:fontRef>
+        </p:style>
+        <p:txBody>
+          <a:bodyPr rtlCol="0" anchor="ctr"/>
+          <a:lstStyle/>
+          <a:p>
+            <a:pPr algn="ctr"/>
+            <a:r>
+              <a:rPr lang="it-IT" sz="1600" dirty="0">
+                <a:latin typeface="Palatino Linotype" panose="02040502050505030304" pitchFamily="18" charset="0"/>
+              </a:rPr>
+              <a:t>Resource </a:t>
+            </a:r>
+            <a:r>
+              <a:rPr lang="it-IT" sz="1600" dirty="0" err="1">
+                <a:latin typeface="Palatino Linotype" panose="02040502050505030304" pitchFamily="18" charset="0"/>
+              </a:rPr>
+              <a:t>identifier</a:t>
+            </a:r>
+            <a:endParaRPr lang="it-IT" sz="1600" dirty="0">
+              <a:latin typeface="Palatino Linotype" panose="02040502050505030304" pitchFamily="18" charset="0"/>
+            </a:endParaRPr>
+          </a:p>
+          <a:p>
+            <a:pPr algn="ctr"/>
+            <a:r>
+              <a:rPr lang="it-IT" sz="1600" dirty="0">
+                <a:latin typeface="Palatino Linotype" panose="02040502050505030304" pitchFamily="18" charset="0"/>
+              </a:rPr>
+              <a:t>(</a:t>
+            </a:r>
+            <a:r>
+              <a:rPr lang="it-IT" sz="1600" dirty="0" err="1">
+                <a:latin typeface="Palatino Linotype" panose="02040502050505030304" pitchFamily="18" charset="0"/>
+              </a:rPr>
+              <a:t>mandatory</a:t>
+            </a:r>
+            <a:r>
+              <a:rPr lang="it-IT" sz="1600" dirty="0">
+                <a:latin typeface="Palatino Linotype" panose="02040502050505030304" pitchFamily="18" charset="0"/>
+              </a:rPr>
+              <a:t>)</a:t>
+            </a:r>
+            <a:endParaRPr lang="en-GB" sz="1600" dirty="0">
+              <a:latin typeface="Palatino Linotype" panose="02040502050505030304" pitchFamily="18" charset="0"/>
+            </a:endParaRPr>
+          </a:p>
+        </p:txBody>
+      </p:sp>
+      <p:sp>
+        <p:nvSpPr>
+          <p:cNvPr id="24" name="Rettangolo arrotondato 23"/>
+          <p:cNvSpPr/>
+          <p:nvPr/>
+        </p:nvSpPr>
+        <p:spPr>
+          <a:xfrm>
+            <a:off x="3978875" y="1828719"/>
+            <a:ext cx="1574133" cy="821144"/>
+          </a:xfrm>
+          <a:prstGeom prst="roundRect">
+            <a:avLst/>
+          </a:prstGeom>
+          <a:solidFill>
+            <a:schemeClr val="accent6">
+              <a:lumMod val="20000"/>
+              <a:lumOff val="80000"/>
+            </a:schemeClr>
+          </a:solidFill>
+        </p:spPr>
+        <p:style>
+          <a:lnRef idx="2">
+            <a:schemeClr val="dk1"/>
+          </a:lnRef>
+          <a:fillRef idx="1">
+            <a:schemeClr val="lt1"/>
+          </a:fillRef>
+          <a:effectRef idx="0">
+            <a:schemeClr val="dk1"/>
+          </a:effectRef>
+          <a:fontRef idx="minor">
+            <a:schemeClr val="dk1"/>
+          </a:fontRef>
+        </p:style>
+        <p:txBody>
+          <a:bodyPr rtlCol="0" anchor="ctr"/>
+          <a:lstStyle/>
+          <a:p>
+            <a:pPr algn="ctr"/>
+            <a:r>
+              <a:rPr lang="it-IT" sz="1600" dirty="0">
+                <a:latin typeface="Palatino Linotype" panose="02040502050505030304" pitchFamily="18" charset="0"/>
+              </a:rPr>
+              <a:t>Control data</a:t>
+            </a:r>
+          </a:p>
+          <a:p>
+            <a:pPr algn="ctr"/>
+            <a:r>
+              <a:rPr lang="it-IT" sz="1600" dirty="0">
+                <a:latin typeface="Palatino Linotype" panose="02040502050505030304" pitchFamily="18" charset="0"/>
+              </a:rPr>
+              <a:t>(</a:t>
+            </a:r>
+            <a:r>
+              <a:rPr lang="it-IT" sz="1600" dirty="0" err="1">
+                <a:latin typeface="Palatino Linotype" panose="02040502050505030304" pitchFamily="18" charset="0"/>
+              </a:rPr>
+              <a:t>mandatory</a:t>
+            </a:r>
+            <a:r>
+              <a:rPr lang="it-IT" sz="1600" dirty="0">
+                <a:latin typeface="Palatino Linotype" panose="02040502050505030304" pitchFamily="18" charset="0"/>
+              </a:rPr>
+              <a:t>)</a:t>
+            </a:r>
+            <a:endParaRPr lang="en-GB" sz="1600" dirty="0">
+              <a:latin typeface="Palatino Linotype" panose="02040502050505030304" pitchFamily="18" charset="0"/>
+            </a:endParaRPr>
+          </a:p>
+        </p:txBody>
+      </p:sp>
+      <p:sp>
+        <p:nvSpPr>
+          <p:cNvPr id="3" name="Segnaposto numero diapositiva 2"/>
+          <p:cNvSpPr>
+            <a:spLocks noGrp="1"/>
+          </p:cNvSpPr>
+          <p:nvPr>
+            <p:ph type="sldNum" sz="quarter" idx="12"/>
+          </p:nvPr>
+        </p:nvSpPr>
+        <p:spPr/>
+        <p:txBody>
+          <a:bodyPr/>
+          <a:lstStyle/>
+          <a:p>
+            <a:fld id="{31DE2C5B-556E-47B8-A792-024C2FCA4ACC}" type="slidenum">
+              <a:rPr lang="en-GB" smtClean="0"/>
+              <a:t>21</a:t>
+            </a:fld>
+            <a:endParaRPr lang="en-GB"/>
+          </a:p>
+        </p:txBody>
+      </p:sp>
+    </p:spTree>
+    <p:extLst>
+      <p:ext uri="{BB962C8B-B14F-4D97-AF65-F5344CB8AC3E}">
+        <p14:creationId xmlns:p14="http://schemas.microsoft.com/office/powerpoint/2010/main" val="1812340316"/>
+      </p:ext>
+    </p:extLst>
+  </p:cSld>
+  <p:clrMapOvr>
+    <a:masterClrMapping/>
+  </p:clrMapOvr>
+</p:sld>
+</file>
+
+<file path=ppt/slides/slide22.xml><?xml version="1.0" encoding="utf-8"?>
+<p:sld xmlns:a="http://schemas.openxmlformats.org/drawingml/2006/main" xmlns:r="http://schemas.openxmlformats.org/officeDocument/2006/relationships" xmlns:p="http://schemas.openxmlformats.org/presentationml/2006/main">
+  <p:cSld>
+    <p:spTree>
+      <p:nvGrpSpPr>
+        <p:cNvPr id="1" name=""/>
+        <p:cNvGrpSpPr/>
+        <p:nvPr/>
+      </p:nvGrpSpPr>
+      <p:grpSpPr>
+        <a:xfrm>
+          <a:off x="0" y="0"/>
+          <a:ext cx="0" cy="0"/>
+          <a:chOff x="0" y="0"/>
+          <a:chExt cx="0" cy="0"/>
+        </a:xfrm>
+      </p:grpSpPr>
+      <p:sp>
+        <p:nvSpPr>
+          <p:cNvPr id="2" name="Titolo 1"/>
+          <p:cNvSpPr>
+            <a:spLocks noGrp="1"/>
+          </p:cNvSpPr>
+          <p:nvPr>
+            <p:ph type="title"/>
+          </p:nvPr>
+        </p:nvSpPr>
+        <p:spPr/>
+        <p:txBody>
+          <a:bodyPr/>
+          <a:lstStyle/>
+          <a:p>
+            <a:r>
+              <a:rPr lang="it-IT" dirty="0"/>
               <a:t>Resource </a:t>
             </a:r>
             <a:r>
@@ -8845,7 +8945,7 @@
           <a:p>
             <a:fld id="{31DE2C5B-556E-47B8-A792-024C2FCA4ACC}" type="slidenum">
               <a:rPr lang="en-GB" smtClean="0"/>
-              <a:t>21</a:t>
+              <a:t>22</a:t>
             </a:fld>
             <a:endParaRPr lang="en-GB"/>
           </a:p>
@@ -8864,7 +8964,7 @@
 </p:sld>
 </file>
 
-<file path=ppt/slides/slide22.xml><?xml version="1.0" encoding="utf-8"?>
+<file path=ppt/slides/slide23.xml><?xml version="1.0" encoding="utf-8"?>
 <p:sld xmlns:a="http://schemas.openxmlformats.org/drawingml/2006/main" xmlns:r="http://schemas.openxmlformats.org/officeDocument/2006/relationships" xmlns:p="http://schemas.openxmlformats.org/presentationml/2006/main">
   <p:cSld>
     <p:spTree>
@@ -9526,7 +9626,7 @@
           <a:p>
             <a:fld id="{31DE2C5B-556E-47B8-A792-024C2FCA4ACC}" type="slidenum">
               <a:rPr lang="en-GB" smtClean="0"/>
-              <a:t>22</a:t>
+              <a:t>23</a:t>
             </a:fld>
             <a:endParaRPr lang="en-GB"/>
           </a:p>
@@ -9545,7 +9645,7 @@
 </p:sld>
 </file>
 
-<file path=ppt/slides/slide23.xml><?xml version="1.0" encoding="utf-8"?>
+<file path=ppt/slides/slide24.xml><?xml version="1.0" encoding="utf-8"?>
 <p:sld xmlns:a="http://schemas.openxmlformats.org/drawingml/2006/main" xmlns:r="http://schemas.openxmlformats.org/officeDocument/2006/relationships" xmlns:p="http://schemas.openxmlformats.org/presentationml/2006/main">
   <p:cSld>
     <p:spTree>
@@ -9634,7 +9734,7 @@
           <a:p>
             <a:fld id="{31DE2C5B-556E-47B8-A792-024C2FCA4ACC}" type="slidenum">
               <a:rPr lang="en-GB" smtClean="0"/>
-              <a:t>23</a:t>
+              <a:t>24</a:t>
             </a:fld>
             <a:endParaRPr lang="en-GB"/>
           </a:p>

</xml_diff>